<commit_message>
Add slide Connect_ioT and main.c
</commit_message>
<xml_diff>
--- a/Slide/Connetc_IOT.pptx
+++ b/Slide/Connetc_IOT.pptx
@@ -20,6 +20,12 @@
     <p:sldId id="268" r:id="rId14"/>
     <p:sldId id="260" r:id="rId15"/>
     <p:sldId id="270" r:id="rId16"/>
+    <p:sldId id="272" r:id="rId17"/>
+    <p:sldId id="275" r:id="rId18"/>
+    <p:sldId id="276" r:id="rId19"/>
+    <p:sldId id="273" r:id="rId20"/>
+    <p:sldId id="274" r:id="rId21"/>
+    <p:sldId id="271" r:id="rId22"/>
   </p:sldIdLst>
   <p:sldSz cx="12192000" cy="6858000"/>
   <p:notesSz cx="6858000" cy="9144000"/>
@@ -257,7 +263,7 @@
           <a:p>
             <a:fld id="{1A3819B9-02CB-40F4-927A-9D3FEABA76E3}" type="datetimeFigureOut">
               <a:rPr lang="en-US" smtClean="0"/>
-              <a:t>3/23/2019</a:t>
+              <a:t>10/27/2019</a:t>
             </a:fld>
             <a:endParaRPr lang="en-US"/>
           </a:p>
@@ -427,7 +433,7 @@
           <a:p>
             <a:fld id="{1A3819B9-02CB-40F4-927A-9D3FEABA76E3}" type="datetimeFigureOut">
               <a:rPr lang="en-US" smtClean="0"/>
-              <a:t>3/23/2019</a:t>
+              <a:t>10/27/2019</a:t>
             </a:fld>
             <a:endParaRPr lang="en-US"/>
           </a:p>
@@ -607,7 +613,7 @@
           <a:p>
             <a:fld id="{1A3819B9-02CB-40F4-927A-9D3FEABA76E3}" type="datetimeFigureOut">
               <a:rPr lang="en-US" smtClean="0"/>
-              <a:t>3/23/2019</a:t>
+              <a:t>10/27/2019</a:t>
             </a:fld>
             <a:endParaRPr lang="en-US"/>
           </a:p>
@@ -777,7 +783,7 @@
           <a:p>
             <a:fld id="{1A3819B9-02CB-40F4-927A-9D3FEABA76E3}" type="datetimeFigureOut">
               <a:rPr lang="en-US" smtClean="0"/>
-              <a:t>3/23/2019</a:t>
+              <a:t>10/27/2019</a:t>
             </a:fld>
             <a:endParaRPr lang="en-US"/>
           </a:p>
@@ -1023,7 +1029,7 @@
           <a:p>
             <a:fld id="{1A3819B9-02CB-40F4-927A-9D3FEABA76E3}" type="datetimeFigureOut">
               <a:rPr lang="en-US" smtClean="0"/>
-              <a:t>3/23/2019</a:t>
+              <a:t>10/27/2019</a:t>
             </a:fld>
             <a:endParaRPr lang="en-US"/>
           </a:p>
@@ -1255,7 +1261,7 @@
           <a:p>
             <a:fld id="{1A3819B9-02CB-40F4-927A-9D3FEABA76E3}" type="datetimeFigureOut">
               <a:rPr lang="en-US" smtClean="0"/>
-              <a:t>3/23/2019</a:t>
+              <a:t>10/27/2019</a:t>
             </a:fld>
             <a:endParaRPr lang="en-US"/>
           </a:p>
@@ -1622,7 +1628,7 @@
           <a:p>
             <a:fld id="{1A3819B9-02CB-40F4-927A-9D3FEABA76E3}" type="datetimeFigureOut">
               <a:rPr lang="en-US" smtClean="0"/>
-              <a:t>3/23/2019</a:t>
+              <a:t>10/27/2019</a:t>
             </a:fld>
             <a:endParaRPr lang="en-US"/>
           </a:p>
@@ -1740,7 +1746,7 @@
           <a:p>
             <a:fld id="{1A3819B9-02CB-40F4-927A-9D3FEABA76E3}" type="datetimeFigureOut">
               <a:rPr lang="en-US" smtClean="0"/>
-              <a:t>3/23/2019</a:t>
+              <a:t>10/27/2019</a:t>
             </a:fld>
             <a:endParaRPr lang="en-US"/>
           </a:p>
@@ -1835,7 +1841,7 @@
           <a:p>
             <a:fld id="{1A3819B9-02CB-40F4-927A-9D3FEABA76E3}" type="datetimeFigureOut">
               <a:rPr lang="en-US" smtClean="0"/>
-              <a:t>3/23/2019</a:t>
+              <a:t>10/27/2019</a:t>
             </a:fld>
             <a:endParaRPr lang="en-US"/>
           </a:p>
@@ -2112,7 +2118,7 @@
           <a:p>
             <a:fld id="{1A3819B9-02CB-40F4-927A-9D3FEABA76E3}" type="datetimeFigureOut">
               <a:rPr lang="en-US" smtClean="0"/>
-              <a:t>3/23/2019</a:t>
+              <a:t>10/27/2019</a:t>
             </a:fld>
             <a:endParaRPr lang="en-US"/>
           </a:p>
@@ -2365,7 +2371,7 @@
           <a:p>
             <a:fld id="{1A3819B9-02CB-40F4-927A-9D3FEABA76E3}" type="datetimeFigureOut">
               <a:rPr lang="en-US" smtClean="0"/>
-              <a:t>3/23/2019</a:t>
+              <a:t>10/27/2019</a:t>
             </a:fld>
             <a:endParaRPr lang="en-US"/>
           </a:p>
@@ -2578,7 +2584,7 @@
           <a:p>
             <a:fld id="{1A3819B9-02CB-40F4-927A-9D3FEABA76E3}" type="datetimeFigureOut">
               <a:rPr lang="en-US" smtClean="0"/>
-              <a:t>3/23/2019</a:t>
+              <a:t>10/27/2019</a:t>
             </a:fld>
             <a:endParaRPr lang="en-US"/>
           </a:p>
@@ -4339,6 +4345,3186 @@
 </p:sld>
 </file>
 
+<file path=ppt/slides/slide16.xml><?xml version="1.0" encoding="utf-8"?>
+<p:sld xmlns:a="http://schemas.openxmlformats.org/drawingml/2006/main" xmlns:r="http://schemas.openxmlformats.org/officeDocument/2006/relationships" xmlns:p="http://schemas.openxmlformats.org/presentationml/2006/main">
+  <p:cSld>
+    <p:spTree>
+      <p:nvGrpSpPr>
+        <p:cNvPr id="1" name=""/>
+        <p:cNvGrpSpPr/>
+        <p:nvPr/>
+      </p:nvGrpSpPr>
+      <p:grpSpPr>
+        <a:xfrm>
+          <a:off x="0" y="0"/>
+          <a:ext cx="0" cy="0"/>
+          <a:chOff x="0" y="0"/>
+          <a:chExt cx="0" cy="0"/>
+        </a:xfrm>
+      </p:grpSpPr>
+      <p:sp>
+        <p:nvSpPr>
+          <p:cNvPr id="2" name="Title 1"/>
+          <p:cNvSpPr>
+            <a:spLocks noGrp="1"/>
+          </p:cNvSpPr>
+          <p:nvPr>
+            <p:ph type="title"/>
+          </p:nvPr>
+        </p:nvSpPr>
+        <p:spPr>
+          <a:xfrm>
+            <a:off x="838200" y="365125"/>
+            <a:ext cx="10515600" cy="895031"/>
+          </a:xfrm>
+        </p:spPr>
+        <p:txBody>
+          <a:bodyPr/>
+          <a:lstStyle/>
+          <a:p>
+            <a:r>
+              <a:rPr lang="en-US" smtClean="0"/>
+              <a:t>RING BUFFER ( SIZE = 8)</a:t>
+            </a:r>
+            <a:endParaRPr lang="en-US"/>
+          </a:p>
+        </p:txBody>
+      </p:sp>
+      <p:sp>
+        <p:nvSpPr>
+          <p:cNvPr id="4" name="Oval 3"/>
+          <p:cNvSpPr/>
+          <p:nvPr/>
+        </p:nvSpPr>
+        <p:spPr>
+          <a:xfrm>
+            <a:off x="2770094" y="2568388"/>
+            <a:ext cx="2823882" cy="2823882"/>
+          </a:xfrm>
+          <a:prstGeom prst="ellipse">
+            <a:avLst/>
+          </a:prstGeom>
+          <a:noFill/>
+          <a:ln>
+            <a:solidFill>
+              <a:schemeClr val="tx1"/>
+            </a:solidFill>
+          </a:ln>
+        </p:spPr>
+        <p:style>
+          <a:lnRef idx="2">
+            <a:schemeClr val="accent1">
+              <a:shade val="50000"/>
+            </a:schemeClr>
+          </a:lnRef>
+          <a:fillRef idx="1">
+            <a:schemeClr val="accent1"/>
+          </a:fillRef>
+          <a:effectRef idx="0">
+            <a:schemeClr val="accent1"/>
+          </a:effectRef>
+          <a:fontRef idx="minor">
+            <a:schemeClr val="lt1"/>
+          </a:fontRef>
+        </p:style>
+        <p:txBody>
+          <a:bodyPr rtlCol="0" anchor="ctr"/>
+          <a:lstStyle/>
+          <a:p>
+            <a:pPr algn="ctr"/>
+            <a:endParaRPr lang="en-US"/>
+          </a:p>
+        </p:txBody>
+      </p:sp>
+      <p:sp>
+        <p:nvSpPr>
+          <p:cNvPr id="5" name="Oval 4"/>
+          <p:cNvSpPr/>
+          <p:nvPr/>
+        </p:nvSpPr>
+        <p:spPr>
+          <a:xfrm>
+            <a:off x="3106271" y="2900408"/>
+            <a:ext cx="2151530" cy="2151530"/>
+          </a:xfrm>
+          <a:prstGeom prst="ellipse">
+            <a:avLst/>
+          </a:prstGeom>
+          <a:solidFill>
+            <a:schemeClr val="bg1"/>
+          </a:solidFill>
+          <a:ln>
+            <a:solidFill>
+              <a:schemeClr val="tx1"/>
+            </a:solidFill>
+          </a:ln>
+        </p:spPr>
+        <p:style>
+          <a:lnRef idx="2">
+            <a:schemeClr val="accent1">
+              <a:shade val="50000"/>
+            </a:schemeClr>
+          </a:lnRef>
+          <a:fillRef idx="1">
+            <a:schemeClr val="accent1"/>
+          </a:fillRef>
+          <a:effectRef idx="0">
+            <a:schemeClr val="accent1"/>
+          </a:effectRef>
+          <a:fontRef idx="minor">
+            <a:schemeClr val="lt1"/>
+          </a:fontRef>
+        </p:style>
+        <p:txBody>
+          <a:bodyPr rtlCol="0" anchor="ctr"/>
+          <a:lstStyle/>
+          <a:p>
+            <a:pPr algn="ctr"/>
+            <a:endParaRPr lang="en-US"/>
+          </a:p>
+        </p:txBody>
+      </p:sp>
+      <p:cxnSp>
+        <p:nvCxnSpPr>
+          <p:cNvPr id="7" name="Straight Connector 6"/>
+          <p:cNvCxnSpPr>
+            <a:stCxn id="4" idx="1"/>
+            <a:endCxn id="5" idx="1"/>
+          </p:cNvCxnSpPr>
+          <p:nvPr/>
+        </p:nvCxnSpPr>
+        <p:spPr>
+          <a:xfrm>
+            <a:off x="3183642" y="2981936"/>
+            <a:ext cx="237713" cy="233556"/>
+          </a:xfrm>
+          <a:prstGeom prst="line">
+            <a:avLst/>
+          </a:prstGeom>
+        </p:spPr>
+        <p:style>
+          <a:lnRef idx="1">
+            <a:schemeClr val="accent1"/>
+          </a:lnRef>
+          <a:fillRef idx="0">
+            <a:schemeClr val="accent1"/>
+          </a:fillRef>
+          <a:effectRef idx="0">
+            <a:schemeClr val="accent1"/>
+          </a:effectRef>
+          <a:fontRef idx="minor">
+            <a:schemeClr val="tx1"/>
+          </a:fontRef>
+        </p:style>
+      </p:cxnSp>
+      <p:cxnSp>
+        <p:nvCxnSpPr>
+          <p:cNvPr id="9" name="Straight Connector 8"/>
+          <p:cNvCxnSpPr>
+            <a:stCxn id="4" idx="0"/>
+            <a:endCxn id="5" idx="0"/>
+          </p:cNvCxnSpPr>
+          <p:nvPr/>
+        </p:nvCxnSpPr>
+        <p:spPr>
+          <a:xfrm>
+            <a:off x="4182035" y="2568388"/>
+            <a:ext cx="1" cy="332020"/>
+          </a:xfrm>
+          <a:prstGeom prst="line">
+            <a:avLst/>
+          </a:prstGeom>
+        </p:spPr>
+        <p:style>
+          <a:lnRef idx="1">
+            <a:schemeClr val="accent1"/>
+          </a:lnRef>
+          <a:fillRef idx="0">
+            <a:schemeClr val="accent1"/>
+          </a:fillRef>
+          <a:effectRef idx="0">
+            <a:schemeClr val="accent1"/>
+          </a:effectRef>
+          <a:fontRef idx="minor">
+            <a:schemeClr val="tx1"/>
+          </a:fontRef>
+        </p:style>
+      </p:cxnSp>
+      <p:cxnSp>
+        <p:nvCxnSpPr>
+          <p:cNvPr id="12" name="Straight Connector 11"/>
+          <p:cNvCxnSpPr>
+            <a:stCxn id="4" idx="7"/>
+            <a:endCxn id="5" idx="7"/>
+          </p:cNvCxnSpPr>
+          <p:nvPr/>
+        </p:nvCxnSpPr>
+        <p:spPr>
+          <a:xfrm flipH="1">
+            <a:off x="4942717" y="2981936"/>
+            <a:ext cx="237711" cy="233556"/>
+          </a:xfrm>
+          <a:prstGeom prst="line">
+            <a:avLst/>
+          </a:prstGeom>
+        </p:spPr>
+        <p:style>
+          <a:lnRef idx="1">
+            <a:schemeClr val="accent1"/>
+          </a:lnRef>
+          <a:fillRef idx="0">
+            <a:schemeClr val="accent1"/>
+          </a:fillRef>
+          <a:effectRef idx="0">
+            <a:schemeClr val="accent1"/>
+          </a:effectRef>
+          <a:fontRef idx="minor">
+            <a:schemeClr val="tx1"/>
+          </a:fontRef>
+        </p:style>
+      </p:cxnSp>
+      <p:cxnSp>
+        <p:nvCxnSpPr>
+          <p:cNvPr id="14" name="Straight Connector 13"/>
+          <p:cNvCxnSpPr>
+            <a:stCxn id="5" idx="6"/>
+            <a:endCxn id="4" idx="6"/>
+          </p:cNvCxnSpPr>
+          <p:nvPr/>
+        </p:nvCxnSpPr>
+        <p:spPr>
+          <a:xfrm>
+            <a:off x="5257801" y="3976173"/>
+            <a:ext cx="336175" cy="4156"/>
+          </a:xfrm>
+          <a:prstGeom prst="line">
+            <a:avLst/>
+          </a:prstGeom>
+        </p:spPr>
+        <p:style>
+          <a:lnRef idx="1">
+            <a:schemeClr val="accent1"/>
+          </a:lnRef>
+          <a:fillRef idx="0">
+            <a:schemeClr val="accent1"/>
+          </a:fillRef>
+          <a:effectRef idx="0">
+            <a:schemeClr val="accent1"/>
+          </a:effectRef>
+          <a:fontRef idx="minor">
+            <a:schemeClr val="tx1"/>
+          </a:fontRef>
+        </p:style>
+      </p:cxnSp>
+      <p:cxnSp>
+        <p:nvCxnSpPr>
+          <p:cNvPr id="16" name="Straight Connector 15"/>
+          <p:cNvCxnSpPr>
+            <a:stCxn id="5" idx="5"/>
+            <a:endCxn id="4" idx="5"/>
+          </p:cNvCxnSpPr>
+          <p:nvPr/>
+        </p:nvCxnSpPr>
+        <p:spPr>
+          <a:xfrm>
+            <a:off x="4942717" y="4736854"/>
+            <a:ext cx="237711" cy="241868"/>
+          </a:xfrm>
+          <a:prstGeom prst="line">
+            <a:avLst/>
+          </a:prstGeom>
+        </p:spPr>
+        <p:style>
+          <a:lnRef idx="1">
+            <a:schemeClr val="accent1"/>
+          </a:lnRef>
+          <a:fillRef idx="0">
+            <a:schemeClr val="accent1"/>
+          </a:fillRef>
+          <a:effectRef idx="0">
+            <a:schemeClr val="accent1"/>
+          </a:effectRef>
+          <a:fontRef idx="minor">
+            <a:schemeClr val="tx1"/>
+          </a:fontRef>
+        </p:style>
+      </p:cxnSp>
+      <p:cxnSp>
+        <p:nvCxnSpPr>
+          <p:cNvPr id="18" name="Straight Connector 17"/>
+          <p:cNvCxnSpPr>
+            <a:stCxn id="5" idx="4"/>
+            <a:endCxn id="4" idx="4"/>
+          </p:cNvCxnSpPr>
+          <p:nvPr/>
+        </p:nvCxnSpPr>
+        <p:spPr>
+          <a:xfrm flipH="1">
+            <a:off x="4182035" y="5051938"/>
+            <a:ext cx="1" cy="340332"/>
+          </a:xfrm>
+          <a:prstGeom prst="line">
+            <a:avLst/>
+          </a:prstGeom>
+        </p:spPr>
+        <p:style>
+          <a:lnRef idx="1">
+            <a:schemeClr val="accent1"/>
+          </a:lnRef>
+          <a:fillRef idx="0">
+            <a:schemeClr val="accent1"/>
+          </a:fillRef>
+          <a:effectRef idx="0">
+            <a:schemeClr val="accent1"/>
+          </a:effectRef>
+          <a:fontRef idx="minor">
+            <a:schemeClr val="tx1"/>
+          </a:fontRef>
+        </p:style>
+      </p:cxnSp>
+      <p:cxnSp>
+        <p:nvCxnSpPr>
+          <p:cNvPr id="20" name="Straight Connector 19"/>
+          <p:cNvCxnSpPr>
+            <a:stCxn id="5" idx="3"/>
+            <a:endCxn id="4" idx="3"/>
+          </p:cNvCxnSpPr>
+          <p:nvPr/>
+        </p:nvCxnSpPr>
+        <p:spPr>
+          <a:xfrm flipH="1">
+            <a:off x="3183642" y="4736854"/>
+            <a:ext cx="237713" cy="241868"/>
+          </a:xfrm>
+          <a:prstGeom prst="line">
+            <a:avLst/>
+          </a:prstGeom>
+        </p:spPr>
+        <p:style>
+          <a:lnRef idx="1">
+            <a:schemeClr val="accent1"/>
+          </a:lnRef>
+          <a:fillRef idx="0">
+            <a:schemeClr val="accent1"/>
+          </a:fillRef>
+          <a:effectRef idx="0">
+            <a:schemeClr val="accent1"/>
+          </a:effectRef>
+          <a:fontRef idx="minor">
+            <a:schemeClr val="tx1"/>
+          </a:fontRef>
+        </p:style>
+      </p:cxnSp>
+      <p:cxnSp>
+        <p:nvCxnSpPr>
+          <p:cNvPr id="22" name="Straight Connector 21"/>
+          <p:cNvCxnSpPr>
+            <a:stCxn id="4" idx="2"/>
+            <a:endCxn id="5" idx="2"/>
+          </p:cNvCxnSpPr>
+          <p:nvPr/>
+        </p:nvCxnSpPr>
+        <p:spPr>
+          <a:xfrm flipV="1">
+            <a:off x="2770094" y="3976173"/>
+            <a:ext cx="336177" cy="4156"/>
+          </a:xfrm>
+          <a:prstGeom prst="line">
+            <a:avLst/>
+          </a:prstGeom>
+        </p:spPr>
+        <p:style>
+          <a:lnRef idx="1">
+            <a:schemeClr val="accent1"/>
+          </a:lnRef>
+          <a:fillRef idx="0">
+            <a:schemeClr val="accent1"/>
+          </a:fillRef>
+          <a:effectRef idx="0">
+            <a:schemeClr val="accent1"/>
+          </a:effectRef>
+          <a:fontRef idx="minor">
+            <a:schemeClr val="tx1"/>
+          </a:fontRef>
+        </p:style>
+      </p:cxnSp>
+      <p:sp>
+        <p:nvSpPr>
+          <p:cNvPr id="25" name="TextBox 24"/>
+          <p:cNvSpPr txBox="1"/>
+          <p:nvPr/>
+        </p:nvSpPr>
+        <p:spPr>
+          <a:xfrm rot="20071508">
+            <a:off x="2348685" y="1768969"/>
+            <a:ext cx="1266822" cy="369332"/>
+          </a:xfrm>
+          <a:prstGeom prst="rect">
+            <a:avLst/>
+          </a:prstGeom>
+          <a:noFill/>
+        </p:spPr>
+        <p:txBody>
+          <a:bodyPr wrap="none" rtlCol="0">
+            <a:spAutoFit/>
+          </a:bodyPr>
+          <a:lstStyle/>
+          <a:p>
+            <a:r>
+              <a:rPr lang="en-US" smtClean="0"/>
+              <a:t>Write index</a:t>
+            </a:r>
+            <a:endParaRPr lang="en-US"/>
+          </a:p>
+        </p:txBody>
+      </p:sp>
+      <p:cxnSp>
+        <p:nvCxnSpPr>
+          <p:cNvPr id="27" name="Straight Arrow Connector 26"/>
+          <p:cNvCxnSpPr/>
+          <p:nvPr/>
+        </p:nvCxnSpPr>
+        <p:spPr>
+          <a:xfrm>
+            <a:off x="3383668" y="1975366"/>
+            <a:ext cx="711142" cy="465839"/>
+          </a:xfrm>
+          <a:prstGeom prst="straightConnector1">
+            <a:avLst/>
+          </a:prstGeom>
+          <a:ln>
+            <a:tailEnd type="triangle"/>
+          </a:ln>
+        </p:spPr>
+        <p:style>
+          <a:lnRef idx="1">
+            <a:schemeClr val="accent1"/>
+          </a:lnRef>
+          <a:fillRef idx="0">
+            <a:schemeClr val="accent1"/>
+          </a:fillRef>
+          <a:effectRef idx="0">
+            <a:schemeClr val="accent1"/>
+          </a:effectRef>
+          <a:fontRef idx="minor">
+            <a:schemeClr val="tx1"/>
+          </a:fontRef>
+        </p:style>
+      </p:cxnSp>
+      <p:sp>
+        <p:nvSpPr>
+          <p:cNvPr id="29" name="TextBox 28"/>
+          <p:cNvSpPr txBox="1"/>
+          <p:nvPr/>
+        </p:nvSpPr>
+        <p:spPr>
+          <a:xfrm rot="2170791">
+            <a:off x="4984513" y="1836171"/>
+            <a:ext cx="1266822" cy="369332"/>
+          </a:xfrm>
+          <a:prstGeom prst="rect">
+            <a:avLst/>
+          </a:prstGeom>
+          <a:noFill/>
+        </p:spPr>
+        <p:txBody>
+          <a:bodyPr wrap="square" rtlCol="0">
+            <a:spAutoFit/>
+          </a:bodyPr>
+          <a:lstStyle/>
+          <a:p>
+            <a:r>
+              <a:rPr lang="en-US" smtClean="0"/>
+              <a:t>Read index</a:t>
+            </a:r>
+            <a:endParaRPr lang="en-US"/>
+          </a:p>
+        </p:txBody>
+      </p:sp>
+      <p:cxnSp>
+        <p:nvCxnSpPr>
+          <p:cNvPr id="30" name="Straight Arrow Connector 29"/>
+          <p:cNvCxnSpPr/>
+          <p:nvPr/>
+        </p:nvCxnSpPr>
+        <p:spPr>
+          <a:xfrm flipH="1">
+            <a:off x="4331439" y="2055811"/>
+            <a:ext cx="698088" cy="460542"/>
+          </a:xfrm>
+          <a:prstGeom prst="straightConnector1">
+            <a:avLst/>
+          </a:prstGeom>
+          <a:ln>
+            <a:tailEnd type="triangle"/>
+          </a:ln>
+        </p:spPr>
+        <p:style>
+          <a:lnRef idx="1">
+            <a:schemeClr val="accent1"/>
+          </a:lnRef>
+          <a:fillRef idx="0">
+            <a:schemeClr val="accent1"/>
+          </a:fillRef>
+          <a:effectRef idx="0">
+            <a:schemeClr val="accent1"/>
+          </a:effectRef>
+          <a:fontRef idx="minor">
+            <a:schemeClr val="tx1"/>
+          </a:fontRef>
+        </p:style>
+      </p:cxnSp>
+      <p:sp>
+        <p:nvSpPr>
+          <p:cNvPr id="37" name="Arc 36"/>
+          <p:cNvSpPr/>
+          <p:nvPr/>
+        </p:nvSpPr>
+        <p:spPr>
+          <a:xfrm rot="3361383">
+            <a:off x="3399285" y="3192080"/>
+            <a:ext cx="2299269" cy="2534984"/>
+          </a:xfrm>
+          <a:prstGeom prst="arc">
+            <a:avLst>
+              <a:gd name="adj1" fmla="val 17435477"/>
+              <a:gd name="adj2" fmla="val 2814004"/>
+            </a:avLst>
+          </a:prstGeom>
+          <a:ln>
+            <a:headEnd type="stealth"/>
+            <a:tailEnd type="stealth"/>
+          </a:ln>
+        </p:spPr>
+        <p:style>
+          <a:lnRef idx="1">
+            <a:schemeClr val="accent1"/>
+          </a:lnRef>
+          <a:fillRef idx="0">
+            <a:schemeClr val="accent1"/>
+          </a:fillRef>
+          <a:effectRef idx="0">
+            <a:schemeClr val="accent1"/>
+          </a:effectRef>
+          <a:fontRef idx="minor">
+            <a:schemeClr val="tx1"/>
+          </a:fontRef>
+        </p:style>
+        <p:txBody>
+          <a:bodyPr rtlCol="0" anchor="ctr"/>
+          <a:lstStyle/>
+          <a:p>
+            <a:pPr algn="ctr"/>
+            <a:endParaRPr lang="en-US"/>
+          </a:p>
+        </p:txBody>
+      </p:sp>
+      <p:sp>
+        <p:nvSpPr>
+          <p:cNvPr id="38" name="TextBox 37"/>
+          <p:cNvSpPr txBox="1"/>
+          <p:nvPr/>
+        </p:nvSpPr>
+        <p:spPr>
+          <a:xfrm>
+            <a:off x="2788116" y="5994258"/>
+            <a:ext cx="2882199" cy="369332"/>
+          </a:xfrm>
+          <a:prstGeom prst="rect">
+            <a:avLst/>
+          </a:prstGeom>
+          <a:noFill/>
+        </p:spPr>
+        <p:txBody>
+          <a:bodyPr wrap="none" rtlCol="0">
+            <a:spAutoFit/>
+          </a:bodyPr>
+          <a:lstStyle/>
+          <a:p>
+            <a:r>
+              <a:rPr lang="en-US" smtClean="0"/>
+              <a:t>Lúc ban đầu, chưa có dữ liệu</a:t>
+            </a:r>
+            <a:endParaRPr lang="en-US"/>
+          </a:p>
+        </p:txBody>
+      </p:sp>
+      <p:sp>
+        <p:nvSpPr>
+          <p:cNvPr id="39" name="TextBox 38"/>
+          <p:cNvSpPr txBox="1"/>
+          <p:nvPr/>
+        </p:nvSpPr>
+        <p:spPr>
+          <a:xfrm>
+            <a:off x="6584485" y="2577678"/>
+            <a:ext cx="5736442" cy="1200329"/>
+          </a:xfrm>
+          <a:prstGeom prst="rect">
+            <a:avLst/>
+          </a:prstGeom>
+          <a:noFill/>
+        </p:spPr>
+        <p:txBody>
+          <a:bodyPr wrap="none" rtlCol="0">
+            <a:spAutoFit/>
+          </a:bodyPr>
+          <a:lstStyle/>
+          <a:p>
+            <a:pPr marL="285750" indent="-285750">
+              <a:buFont typeface="Wingdings" panose="05000000000000000000" pitchFamily="2" charset="2"/>
+              <a:buChar char="§"/>
+            </a:pPr>
+            <a:r>
+              <a:rPr lang="en-US" smtClean="0"/>
+              <a:t>Số </a:t>
+            </a:r>
+            <a:r>
+              <a:rPr lang="en-US" smtClean="0"/>
+              <a:t>unit</a:t>
+            </a:r>
+            <a:r>
+              <a:rPr lang="en-US" smtClean="0"/>
+              <a:t> ghi trống = size (toàn bộ data đã được đọc hết)</a:t>
+            </a:r>
+          </a:p>
+          <a:p>
+            <a:pPr marL="285750" indent="-285750">
+              <a:buFont typeface="Wingdings" panose="05000000000000000000" pitchFamily="2" charset="2"/>
+              <a:buChar char="§"/>
+            </a:pPr>
+            <a:r>
+              <a:rPr lang="en-US" smtClean="0"/>
+              <a:t>Số unit có thể đọc = 0 </a:t>
+            </a:r>
+          </a:p>
+          <a:p>
+            <a:pPr marL="285750" indent="-285750">
+              <a:buFont typeface="Wingdings" panose="05000000000000000000" pitchFamily="2" charset="2"/>
+              <a:buChar char="§"/>
+            </a:pPr>
+            <a:r>
+              <a:rPr lang="en-US" smtClean="0"/>
+              <a:t>Trong trường hợp này, số unit có thể ghi được là 8 = size</a:t>
+            </a:r>
+          </a:p>
+          <a:p>
+            <a:pPr marL="285750" indent="-285750">
+              <a:buFont typeface="Wingdings" panose="05000000000000000000" pitchFamily="2" charset="2"/>
+              <a:buChar char="§"/>
+            </a:pPr>
+            <a:r>
+              <a:rPr lang="en-US" smtClean="0"/>
+              <a:t>Số byte có thể đọc ra là 0 unit, vì lúc này chưa có data.</a:t>
+            </a:r>
+            <a:r>
+              <a:rPr lang="en-US" smtClean="0"/>
+              <a:t>  </a:t>
+            </a:r>
+            <a:endParaRPr lang="en-US"/>
+          </a:p>
+        </p:txBody>
+      </p:sp>
+      <p:cxnSp>
+        <p:nvCxnSpPr>
+          <p:cNvPr id="6" name="Straight Connector 5"/>
+          <p:cNvCxnSpPr/>
+          <p:nvPr/>
+        </p:nvCxnSpPr>
+        <p:spPr>
+          <a:xfrm>
+            <a:off x="4182035" y="2084294"/>
+            <a:ext cx="0" cy="3832412"/>
+          </a:xfrm>
+          <a:prstGeom prst="line">
+            <a:avLst/>
+          </a:prstGeom>
+          <a:ln>
+            <a:prstDash val="dash"/>
+          </a:ln>
+        </p:spPr>
+        <p:style>
+          <a:lnRef idx="1">
+            <a:schemeClr val="accent1"/>
+          </a:lnRef>
+          <a:fillRef idx="0">
+            <a:schemeClr val="accent1"/>
+          </a:fillRef>
+          <a:effectRef idx="0">
+            <a:schemeClr val="accent1"/>
+          </a:effectRef>
+          <a:fontRef idx="minor">
+            <a:schemeClr val="tx1"/>
+          </a:fontRef>
+        </p:style>
+      </p:cxnSp>
+      <p:sp>
+        <p:nvSpPr>
+          <p:cNvPr id="23" name="TextBox 22"/>
+          <p:cNvSpPr txBox="1"/>
+          <p:nvPr/>
+        </p:nvSpPr>
+        <p:spPr>
+          <a:xfrm>
+            <a:off x="3662476" y="1559296"/>
+            <a:ext cx="1178400" cy="369332"/>
+          </a:xfrm>
+          <a:prstGeom prst="rect">
+            <a:avLst/>
+          </a:prstGeom>
+          <a:noFill/>
+        </p:spPr>
+        <p:txBody>
+          <a:bodyPr wrap="none" rtlCol="0">
+            <a:spAutoFit/>
+          </a:bodyPr>
+          <a:lstStyle/>
+          <a:p>
+            <a:r>
+              <a:rPr lang="en-US" smtClean="0"/>
+              <a:t>Start point</a:t>
+            </a:r>
+            <a:endParaRPr lang="en-US"/>
+          </a:p>
+        </p:txBody>
+      </p:sp>
+      <p:cxnSp>
+        <p:nvCxnSpPr>
+          <p:cNvPr id="24" name="Straight Arrow Connector 23"/>
+          <p:cNvCxnSpPr/>
+          <p:nvPr/>
+        </p:nvCxnSpPr>
+        <p:spPr>
+          <a:xfrm flipH="1">
+            <a:off x="4269261" y="1940209"/>
+            <a:ext cx="124356" cy="565857"/>
+          </a:xfrm>
+          <a:prstGeom prst="straightConnector1">
+            <a:avLst/>
+          </a:prstGeom>
+          <a:ln>
+            <a:tailEnd type="triangle"/>
+          </a:ln>
+        </p:spPr>
+        <p:style>
+          <a:lnRef idx="1">
+            <a:schemeClr val="accent1"/>
+          </a:lnRef>
+          <a:fillRef idx="0">
+            <a:schemeClr val="accent1"/>
+          </a:fillRef>
+          <a:effectRef idx="0">
+            <a:schemeClr val="accent1"/>
+          </a:effectRef>
+          <a:fontRef idx="minor">
+            <a:schemeClr val="tx1"/>
+          </a:fontRef>
+        </p:style>
+      </p:cxnSp>
+    </p:spTree>
+    <p:extLst>
+      <p:ext uri="{BB962C8B-B14F-4D97-AF65-F5344CB8AC3E}">
+        <p14:creationId xmlns:p14="http://schemas.microsoft.com/office/powerpoint/2010/main" val="2727999061"/>
+      </p:ext>
+    </p:extLst>
+  </p:cSld>
+  <p:clrMapOvr>
+    <a:masterClrMapping/>
+  </p:clrMapOvr>
+</p:sld>
+</file>
+
+<file path=ppt/slides/slide17.xml><?xml version="1.0" encoding="utf-8"?>
+<p:sld xmlns:a="http://schemas.openxmlformats.org/drawingml/2006/main" xmlns:r="http://schemas.openxmlformats.org/officeDocument/2006/relationships" xmlns:p="http://schemas.openxmlformats.org/presentationml/2006/main">
+  <p:cSld>
+    <p:spTree>
+      <p:nvGrpSpPr>
+        <p:cNvPr id="1" name=""/>
+        <p:cNvGrpSpPr/>
+        <p:nvPr/>
+      </p:nvGrpSpPr>
+      <p:grpSpPr>
+        <a:xfrm>
+          <a:off x="0" y="0"/>
+          <a:ext cx="0" cy="0"/>
+          <a:chOff x="0" y="0"/>
+          <a:chExt cx="0" cy="0"/>
+        </a:xfrm>
+      </p:grpSpPr>
+      <p:sp>
+        <p:nvSpPr>
+          <p:cNvPr id="2" name="Title 1"/>
+          <p:cNvSpPr>
+            <a:spLocks noGrp="1"/>
+          </p:cNvSpPr>
+          <p:nvPr>
+            <p:ph type="title"/>
+          </p:nvPr>
+        </p:nvSpPr>
+        <p:spPr>
+          <a:xfrm>
+            <a:off x="838200" y="365125"/>
+            <a:ext cx="10515600" cy="895031"/>
+          </a:xfrm>
+        </p:spPr>
+        <p:txBody>
+          <a:bodyPr/>
+          <a:lstStyle/>
+          <a:p>
+            <a:r>
+              <a:rPr lang="en-US" smtClean="0"/>
+              <a:t>RING BUFFER ( SIZE = 8)</a:t>
+            </a:r>
+            <a:endParaRPr lang="en-US"/>
+          </a:p>
+        </p:txBody>
+      </p:sp>
+      <p:sp>
+        <p:nvSpPr>
+          <p:cNvPr id="4" name="Oval 3"/>
+          <p:cNvSpPr/>
+          <p:nvPr/>
+        </p:nvSpPr>
+        <p:spPr>
+          <a:xfrm>
+            <a:off x="1707777" y="2554941"/>
+            <a:ext cx="2823882" cy="2823882"/>
+          </a:xfrm>
+          <a:prstGeom prst="ellipse">
+            <a:avLst/>
+          </a:prstGeom>
+          <a:noFill/>
+          <a:ln>
+            <a:solidFill>
+              <a:schemeClr val="tx1"/>
+            </a:solidFill>
+          </a:ln>
+        </p:spPr>
+        <p:style>
+          <a:lnRef idx="2">
+            <a:schemeClr val="accent1">
+              <a:shade val="50000"/>
+            </a:schemeClr>
+          </a:lnRef>
+          <a:fillRef idx="1">
+            <a:schemeClr val="accent1"/>
+          </a:fillRef>
+          <a:effectRef idx="0">
+            <a:schemeClr val="accent1"/>
+          </a:effectRef>
+          <a:fontRef idx="minor">
+            <a:schemeClr val="lt1"/>
+          </a:fontRef>
+        </p:style>
+        <p:txBody>
+          <a:bodyPr rtlCol="0" anchor="ctr"/>
+          <a:lstStyle/>
+          <a:p>
+            <a:pPr algn="ctr"/>
+            <a:endParaRPr lang="en-US"/>
+          </a:p>
+        </p:txBody>
+      </p:sp>
+      <p:sp>
+        <p:nvSpPr>
+          <p:cNvPr id="5" name="Oval 4"/>
+          <p:cNvSpPr/>
+          <p:nvPr/>
+        </p:nvSpPr>
+        <p:spPr>
+          <a:xfrm>
+            <a:off x="2043954" y="2886961"/>
+            <a:ext cx="2151530" cy="2151530"/>
+          </a:xfrm>
+          <a:prstGeom prst="ellipse">
+            <a:avLst/>
+          </a:prstGeom>
+          <a:solidFill>
+            <a:schemeClr val="bg1"/>
+          </a:solidFill>
+          <a:ln>
+            <a:solidFill>
+              <a:schemeClr val="tx1"/>
+            </a:solidFill>
+          </a:ln>
+        </p:spPr>
+        <p:style>
+          <a:lnRef idx="2">
+            <a:schemeClr val="accent1">
+              <a:shade val="50000"/>
+            </a:schemeClr>
+          </a:lnRef>
+          <a:fillRef idx="1">
+            <a:schemeClr val="accent1"/>
+          </a:fillRef>
+          <a:effectRef idx="0">
+            <a:schemeClr val="accent1"/>
+          </a:effectRef>
+          <a:fontRef idx="minor">
+            <a:schemeClr val="lt1"/>
+          </a:fontRef>
+        </p:style>
+        <p:txBody>
+          <a:bodyPr rtlCol="0" anchor="ctr"/>
+          <a:lstStyle/>
+          <a:p>
+            <a:pPr algn="ctr"/>
+            <a:endParaRPr lang="en-US"/>
+          </a:p>
+        </p:txBody>
+      </p:sp>
+      <p:cxnSp>
+        <p:nvCxnSpPr>
+          <p:cNvPr id="7" name="Straight Connector 6"/>
+          <p:cNvCxnSpPr>
+            <a:stCxn id="4" idx="1"/>
+            <a:endCxn id="5" idx="1"/>
+          </p:cNvCxnSpPr>
+          <p:nvPr/>
+        </p:nvCxnSpPr>
+        <p:spPr>
+          <a:xfrm>
+            <a:off x="2121325" y="2968489"/>
+            <a:ext cx="237713" cy="233556"/>
+          </a:xfrm>
+          <a:prstGeom prst="line">
+            <a:avLst/>
+          </a:prstGeom>
+        </p:spPr>
+        <p:style>
+          <a:lnRef idx="1">
+            <a:schemeClr val="accent1"/>
+          </a:lnRef>
+          <a:fillRef idx="0">
+            <a:schemeClr val="accent1"/>
+          </a:fillRef>
+          <a:effectRef idx="0">
+            <a:schemeClr val="accent1"/>
+          </a:effectRef>
+          <a:fontRef idx="minor">
+            <a:schemeClr val="tx1"/>
+          </a:fontRef>
+        </p:style>
+      </p:cxnSp>
+      <p:cxnSp>
+        <p:nvCxnSpPr>
+          <p:cNvPr id="9" name="Straight Connector 8"/>
+          <p:cNvCxnSpPr>
+            <a:stCxn id="4" idx="0"/>
+            <a:endCxn id="5" idx="0"/>
+          </p:cNvCxnSpPr>
+          <p:nvPr/>
+        </p:nvCxnSpPr>
+        <p:spPr>
+          <a:xfrm>
+            <a:off x="3119718" y="2554941"/>
+            <a:ext cx="1" cy="332020"/>
+          </a:xfrm>
+          <a:prstGeom prst="line">
+            <a:avLst/>
+          </a:prstGeom>
+        </p:spPr>
+        <p:style>
+          <a:lnRef idx="1">
+            <a:schemeClr val="accent1"/>
+          </a:lnRef>
+          <a:fillRef idx="0">
+            <a:schemeClr val="accent1"/>
+          </a:fillRef>
+          <a:effectRef idx="0">
+            <a:schemeClr val="accent1"/>
+          </a:effectRef>
+          <a:fontRef idx="minor">
+            <a:schemeClr val="tx1"/>
+          </a:fontRef>
+        </p:style>
+      </p:cxnSp>
+      <p:cxnSp>
+        <p:nvCxnSpPr>
+          <p:cNvPr id="12" name="Straight Connector 11"/>
+          <p:cNvCxnSpPr>
+            <a:stCxn id="4" idx="7"/>
+            <a:endCxn id="5" idx="7"/>
+          </p:cNvCxnSpPr>
+          <p:nvPr/>
+        </p:nvCxnSpPr>
+        <p:spPr>
+          <a:xfrm flipH="1">
+            <a:off x="3880400" y="2968489"/>
+            <a:ext cx="237711" cy="233556"/>
+          </a:xfrm>
+          <a:prstGeom prst="line">
+            <a:avLst/>
+          </a:prstGeom>
+        </p:spPr>
+        <p:style>
+          <a:lnRef idx="1">
+            <a:schemeClr val="accent1"/>
+          </a:lnRef>
+          <a:fillRef idx="0">
+            <a:schemeClr val="accent1"/>
+          </a:fillRef>
+          <a:effectRef idx="0">
+            <a:schemeClr val="accent1"/>
+          </a:effectRef>
+          <a:fontRef idx="minor">
+            <a:schemeClr val="tx1"/>
+          </a:fontRef>
+        </p:style>
+      </p:cxnSp>
+      <p:cxnSp>
+        <p:nvCxnSpPr>
+          <p:cNvPr id="14" name="Straight Connector 13"/>
+          <p:cNvCxnSpPr>
+            <a:stCxn id="5" idx="6"/>
+            <a:endCxn id="4" idx="6"/>
+          </p:cNvCxnSpPr>
+          <p:nvPr/>
+        </p:nvCxnSpPr>
+        <p:spPr>
+          <a:xfrm>
+            <a:off x="4195484" y="3962726"/>
+            <a:ext cx="336175" cy="4156"/>
+          </a:xfrm>
+          <a:prstGeom prst="line">
+            <a:avLst/>
+          </a:prstGeom>
+        </p:spPr>
+        <p:style>
+          <a:lnRef idx="1">
+            <a:schemeClr val="accent1"/>
+          </a:lnRef>
+          <a:fillRef idx="0">
+            <a:schemeClr val="accent1"/>
+          </a:fillRef>
+          <a:effectRef idx="0">
+            <a:schemeClr val="accent1"/>
+          </a:effectRef>
+          <a:fontRef idx="minor">
+            <a:schemeClr val="tx1"/>
+          </a:fontRef>
+        </p:style>
+      </p:cxnSp>
+      <p:cxnSp>
+        <p:nvCxnSpPr>
+          <p:cNvPr id="16" name="Straight Connector 15"/>
+          <p:cNvCxnSpPr>
+            <a:stCxn id="5" idx="5"/>
+            <a:endCxn id="4" idx="5"/>
+          </p:cNvCxnSpPr>
+          <p:nvPr/>
+        </p:nvCxnSpPr>
+        <p:spPr>
+          <a:xfrm>
+            <a:off x="3880400" y="4723407"/>
+            <a:ext cx="237711" cy="241868"/>
+          </a:xfrm>
+          <a:prstGeom prst="line">
+            <a:avLst/>
+          </a:prstGeom>
+        </p:spPr>
+        <p:style>
+          <a:lnRef idx="1">
+            <a:schemeClr val="accent1"/>
+          </a:lnRef>
+          <a:fillRef idx="0">
+            <a:schemeClr val="accent1"/>
+          </a:fillRef>
+          <a:effectRef idx="0">
+            <a:schemeClr val="accent1"/>
+          </a:effectRef>
+          <a:fontRef idx="minor">
+            <a:schemeClr val="tx1"/>
+          </a:fontRef>
+        </p:style>
+      </p:cxnSp>
+      <p:cxnSp>
+        <p:nvCxnSpPr>
+          <p:cNvPr id="18" name="Straight Connector 17"/>
+          <p:cNvCxnSpPr>
+            <a:stCxn id="5" idx="4"/>
+            <a:endCxn id="4" idx="4"/>
+          </p:cNvCxnSpPr>
+          <p:nvPr/>
+        </p:nvCxnSpPr>
+        <p:spPr>
+          <a:xfrm flipH="1">
+            <a:off x="3119718" y="5038491"/>
+            <a:ext cx="1" cy="340332"/>
+          </a:xfrm>
+          <a:prstGeom prst="line">
+            <a:avLst/>
+          </a:prstGeom>
+        </p:spPr>
+        <p:style>
+          <a:lnRef idx="1">
+            <a:schemeClr val="accent1"/>
+          </a:lnRef>
+          <a:fillRef idx="0">
+            <a:schemeClr val="accent1"/>
+          </a:fillRef>
+          <a:effectRef idx="0">
+            <a:schemeClr val="accent1"/>
+          </a:effectRef>
+          <a:fontRef idx="minor">
+            <a:schemeClr val="tx1"/>
+          </a:fontRef>
+        </p:style>
+      </p:cxnSp>
+      <p:cxnSp>
+        <p:nvCxnSpPr>
+          <p:cNvPr id="20" name="Straight Connector 19"/>
+          <p:cNvCxnSpPr>
+            <a:stCxn id="5" idx="3"/>
+            <a:endCxn id="4" idx="3"/>
+          </p:cNvCxnSpPr>
+          <p:nvPr/>
+        </p:nvCxnSpPr>
+        <p:spPr>
+          <a:xfrm flipH="1">
+            <a:off x="2121325" y="4723407"/>
+            <a:ext cx="237713" cy="241868"/>
+          </a:xfrm>
+          <a:prstGeom prst="line">
+            <a:avLst/>
+          </a:prstGeom>
+        </p:spPr>
+        <p:style>
+          <a:lnRef idx="1">
+            <a:schemeClr val="accent1"/>
+          </a:lnRef>
+          <a:fillRef idx="0">
+            <a:schemeClr val="accent1"/>
+          </a:fillRef>
+          <a:effectRef idx="0">
+            <a:schemeClr val="accent1"/>
+          </a:effectRef>
+          <a:fontRef idx="minor">
+            <a:schemeClr val="tx1"/>
+          </a:fontRef>
+        </p:style>
+      </p:cxnSp>
+      <p:cxnSp>
+        <p:nvCxnSpPr>
+          <p:cNvPr id="22" name="Straight Connector 21"/>
+          <p:cNvCxnSpPr>
+            <a:stCxn id="4" idx="2"/>
+            <a:endCxn id="5" idx="2"/>
+          </p:cNvCxnSpPr>
+          <p:nvPr/>
+        </p:nvCxnSpPr>
+        <p:spPr>
+          <a:xfrm flipV="1">
+            <a:off x="1707777" y="3962726"/>
+            <a:ext cx="336177" cy="4156"/>
+          </a:xfrm>
+          <a:prstGeom prst="line">
+            <a:avLst/>
+          </a:prstGeom>
+        </p:spPr>
+        <p:style>
+          <a:lnRef idx="1">
+            <a:schemeClr val="accent1"/>
+          </a:lnRef>
+          <a:fillRef idx="0">
+            <a:schemeClr val="accent1"/>
+          </a:fillRef>
+          <a:effectRef idx="0">
+            <a:schemeClr val="accent1"/>
+          </a:effectRef>
+          <a:fontRef idx="minor">
+            <a:schemeClr val="tx1"/>
+          </a:fontRef>
+        </p:style>
+      </p:cxnSp>
+      <p:sp>
+        <p:nvSpPr>
+          <p:cNvPr id="25" name="TextBox 24"/>
+          <p:cNvSpPr txBox="1"/>
+          <p:nvPr/>
+        </p:nvSpPr>
+        <p:spPr>
+          <a:xfrm rot="20071508">
+            <a:off x="1286368" y="1755522"/>
+            <a:ext cx="1266822" cy="369332"/>
+          </a:xfrm>
+          <a:prstGeom prst="rect">
+            <a:avLst/>
+          </a:prstGeom>
+          <a:noFill/>
+        </p:spPr>
+        <p:txBody>
+          <a:bodyPr wrap="none" rtlCol="0">
+            <a:spAutoFit/>
+          </a:bodyPr>
+          <a:lstStyle/>
+          <a:p>
+            <a:r>
+              <a:rPr lang="en-US" smtClean="0"/>
+              <a:t>Write index</a:t>
+            </a:r>
+            <a:endParaRPr lang="en-US"/>
+          </a:p>
+        </p:txBody>
+      </p:sp>
+      <p:cxnSp>
+        <p:nvCxnSpPr>
+          <p:cNvPr id="27" name="Straight Arrow Connector 26"/>
+          <p:cNvCxnSpPr/>
+          <p:nvPr/>
+        </p:nvCxnSpPr>
+        <p:spPr>
+          <a:xfrm>
+            <a:off x="2321351" y="1961919"/>
+            <a:ext cx="711142" cy="465839"/>
+          </a:xfrm>
+          <a:prstGeom prst="straightConnector1">
+            <a:avLst/>
+          </a:prstGeom>
+          <a:ln>
+            <a:tailEnd type="triangle"/>
+          </a:ln>
+        </p:spPr>
+        <p:style>
+          <a:lnRef idx="1">
+            <a:schemeClr val="accent1"/>
+          </a:lnRef>
+          <a:fillRef idx="0">
+            <a:schemeClr val="accent1"/>
+          </a:fillRef>
+          <a:effectRef idx="0">
+            <a:schemeClr val="accent1"/>
+          </a:effectRef>
+          <a:fontRef idx="minor">
+            <a:schemeClr val="tx1"/>
+          </a:fontRef>
+        </p:style>
+      </p:cxnSp>
+      <p:sp>
+        <p:nvSpPr>
+          <p:cNvPr id="29" name="TextBox 28"/>
+          <p:cNvSpPr txBox="1"/>
+          <p:nvPr/>
+        </p:nvSpPr>
+        <p:spPr>
+          <a:xfrm rot="2170791">
+            <a:off x="3922196" y="1822724"/>
+            <a:ext cx="1266822" cy="369332"/>
+          </a:xfrm>
+          <a:prstGeom prst="rect">
+            <a:avLst/>
+          </a:prstGeom>
+          <a:noFill/>
+        </p:spPr>
+        <p:txBody>
+          <a:bodyPr wrap="square" rtlCol="0">
+            <a:spAutoFit/>
+          </a:bodyPr>
+          <a:lstStyle/>
+          <a:p>
+            <a:r>
+              <a:rPr lang="en-US" smtClean="0"/>
+              <a:t>Read index</a:t>
+            </a:r>
+            <a:endParaRPr lang="en-US"/>
+          </a:p>
+        </p:txBody>
+      </p:sp>
+      <p:cxnSp>
+        <p:nvCxnSpPr>
+          <p:cNvPr id="30" name="Straight Arrow Connector 29"/>
+          <p:cNvCxnSpPr/>
+          <p:nvPr/>
+        </p:nvCxnSpPr>
+        <p:spPr>
+          <a:xfrm flipH="1">
+            <a:off x="3269122" y="2042364"/>
+            <a:ext cx="698088" cy="460542"/>
+          </a:xfrm>
+          <a:prstGeom prst="straightConnector1">
+            <a:avLst/>
+          </a:prstGeom>
+          <a:ln>
+            <a:tailEnd type="triangle"/>
+          </a:ln>
+        </p:spPr>
+        <p:style>
+          <a:lnRef idx="1">
+            <a:schemeClr val="accent1"/>
+          </a:lnRef>
+          <a:fillRef idx="0">
+            <a:schemeClr val="accent1"/>
+          </a:fillRef>
+          <a:effectRef idx="0">
+            <a:schemeClr val="accent1"/>
+          </a:effectRef>
+          <a:fontRef idx="minor">
+            <a:schemeClr val="tx1"/>
+          </a:fontRef>
+        </p:style>
+      </p:cxnSp>
+      <p:sp>
+        <p:nvSpPr>
+          <p:cNvPr id="37" name="Arc 36"/>
+          <p:cNvSpPr/>
+          <p:nvPr/>
+        </p:nvSpPr>
+        <p:spPr>
+          <a:xfrm rot="3361383">
+            <a:off x="2336968" y="3178633"/>
+            <a:ext cx="2299269" cy="2534984"/>
+          </a:xfrm>
+          <a:prstGeom prst="arc">
+            <a:avLst>
+              <a:gd name="adj1" fmla="val 17435477"/>
+              <a:gd name="adj2" fmla="val 2814004"/>
+            </a:avLst>
+          </a:prstGeom>
+          <a:ln>
+            <a:headEnd type="stealth"/>
+            <a:tailEnd type="stealth"/>
+          </a:ln>
+        </p:spPr>
+        <p:style>
+          <a:lnRef idx="1">
+            <a:schemeClr val="accent1"/>
+          </a:lnRef>
+          <a:fillRef idx="0">
+            <a:schemeClr val="accent1"/>
+          </a:fillRef>
+          <a:effectRef idx="0">
+            <a:schemeClr val="accent1"/>
+          </a:effectRef>
+          <a:fontRef idx="minor">
+            <a:schemeClr val="tx1"/>
+          </a:fontRef>
+        </p:style>
+        <p:txBody>
+          <a:bodyPr rtlCol="0" anchor="ctr"/>
+          <a:lstStyle/>
+          <a:p>
+            <a:pPr algn="ctr"/>
+            <a:endParaRPr lang="en-US"/>
+          </a:p>
+        </p:txBody>
+      </p:sp>
+      <p:sp>
+        <p:nvSpPr>
+          <p:cNvPr id="38" name="TextBox 37"/>
+          <p:cNvSpPr txBox="1"/>
+          <p:nvPr/>
+        </p:nvSpPr>
+        <p:spPr>
+          <a:xfrm>
+            <a:off x="1725799" y="5980811"/>
+            <a:ext cx="2882199" cy="369332"/>
+          </a:xfrm>
+          <a:prstGeom prst="rect">
+            <a:avLst/>
+          </a:prstGeom>
+          <a:noFill/>
+        </p:spPr>
+        <p:txBody>
+          <a:bodyPr wrap="none" rtlCol="0">
+            <a:spAutoFit/>
+          </a:bodyPr>
+          <a:lstStyle/>
+          <a:p>
+            <a:r>
+              <a:rPr lang="en-US" smtClean="0"/>
+              <a:t>Lúc ban đầu, chưa có dữ liệu</a:t>
+            </a:r>
+            <a:endParaRPr lang="en-US"/>
+          </a:p>
+        </p:txBody>
+      </p:sp>
+      <p:sp>
+        <p:nvSpPr>
+          <p:cNvPr id="39" name="TextBox 38"/>
+          <p:cNvSpPr txBox="1"/>
+          <p:nvPr/>
+        </p:nvSpPr>
+        <p:spPr>
+          <a:xfrm>
+            <a:off x="5175889" y="1470970"/>
+            <a:ext cx="6603735" cy="3693319"/>
+          </a:xfrm>
+          <a:prstGeom prst="rect">
+            <a:avLst/>
+          </a:prstGeom>
+          <a:noFill/>
+        </p:spPr>
+        <p:txBody>
+          <a:bodyPr wrap="square" rtlCol="0">
+            <a:spAutoFit/>
+          </a:bodyPr>
+          <a:lstStyle/>
+          <a:p>
+            <a:pPr marL="285750" indent="-285750">
+              <a:buFont typeface="Wingdings" panose="05000000000000000000" pitchFamily="2" charset="2"/>
+              <a:buChar char="§"/>
+            </a:pPr>
+            <a:r>
+              <a:rPr lang="en-US" smtClean="0"/>
+              <a:t>Xét trường hợp ghi vào buffer với số unit tối đa là 8 unit </a:t>
+            </a:r>
+          </a:p>
+          <a:p>
+            <a:pPr marL="285750" indent="-285750">
+              <a:buFont typeface="Wingdings" panose="05000000000000000000" pitchFamily="2" charset="2"/>
+              <a:buChar char="§"/>
+            </a:pPr>
+            <a:r>
+              <a:rPr lang="en-US" smtClean="0"/>
+              <a:t>Lúc này write index = read index nhưng số byte có thể</a:t>
+            </a:r>
+          </a:p>
+          <a:p>
+            <a:r>
+              <a:rPr lang="en-US" smtClean="0"/>
+              <a:t>Ghi được = 0, số unit có thể đọc được = 8. </a:t>
+            </a:r>
+          </a:p>
+          <a:p>
+            <a:pPr marL="285750" indent="-285750">
+              <a:buFont typeface="Symbol" panose="05050102010706020507" pitchFamily="18" charset="2"/>
+              <a:buChar char="Þ"/>
+            </a:pPr>
+            <a:r>
+              <a:rPr lang="en-US" smtClean="0"/>
+              <a:t>Tương đối phức tạp để phân biệt 2 trường hợp này. Vì </a:t>
+            </a:r>
+          </a:p>
+          <a:p>
+            <a:r>
+              <a:rPr lang="en-US" smtClean="0"/>
+              <a:t>Vậy trong một tip được đưa ra là không ghi tới vị trí của </a:t>
+            </a:r>
+          </a:p>
+          <a:p>
+            <a:r>
+              <a:rPr lang="en-US" smtClean="0"/>
+              <a:t>Read index, dành ra 1 byte cách ra với read index. Nghĩa là </a:t>
+            </a:r>
+          </a:p>
+          <a:p>
+            <a:r>
+              <a:rPr lang="en-US" smtClean="0"/>
+              <a:t>Trong trường hợp này số unit tối đa ghi được là 7 unit, như vậy</a:t>
+            </a:r>
+          </a:p>
+          <a:p>
+            <a:r>
+              <a:rPr lang="en-US" smtClean="0"/>
+              <a:t>Sẽ không bao giờ xảy ra trường hợp write index = read index khi ghi dữ liệu vào -&gt; đảm bảo được rằng write index = read index chỉ trong trường hợp đọc.</a:t>
+            </a:r>
+          </a:p>
+          <a:p>
+            <a:r>
+              <a:rPr lang="en-US" smtClean="0"/>
+              <a:t>=&gt; Với trường hợp write index = read index được thực hiện theo tip trên, số unit có thể đọc được là 0. số unit có thể ghi được là size của buffer.</a:t>
+            </a:r>
+          </a:p>
+        </p:txBody>
+      </p:sp>
+      <p:cxnSp>
+        <p:nvCxnSpPr>
+          <p:cNvPr id="6" name="Straight Connector 5"/>
+          <p:cNvCxnSpPr/>
+          <p:nvPr/>
+        </p:nvCxnSpPr>
+        <p:spPr>
+          <a:xfrm>
+            <a:off x="3119718" y="2070847"/>
+            <a:ext cx="0" cy="3832412"/>
+          </a:xfrm>
+          <a:prstGeom prst="line">
+            <a:avLst/>
+          </a:prstGeom>
+          <a:ln>
+            <a:prstDash val="dash"/>
+          </a:ln>
+        </p:spPr>
+        <p:style>
+          <a:lnRef idx="1">
+            <a:schemeClr val="accent1"/>
+          </a:lnRef>
+          <a:fillRef idx="0">
+            <a:schemeClr val="accent1"/>
+          </a:fillRef>
+          <a:effectRef idx="0">
+            <a:schemeClr val="accent1"/>
+          </a:effectRef>
+          <a:fontRef idx="minor">
+            <a:schemeClr val="tx1"/>
+          </a:fontRef>
+        </p:style>
+      </p:cxnSp>
+      <p:sp>
+        <p:nvSpPr>
+          <p:cNvPr id="23" name="TextBox 22"/>
+          <p:cNvSpPr txBox="1"/>
+          <p:nvPr/>
+        </p:nvSpPr>
+        <p:spPr>
+          <a:xfrm>
+            <a:off x="2600159" y="1545849"/>
+            <a:ext cx="1178400" cy="369332"/>
+          </a:xfrm>
+          <a:prstGeom prst="rect">
+            <a:avLst/>
+          </a:prstGeom>
+          <a:noFill/>
+        </p:spPr>
+        <p:txBody>
+          <a:bodyPr wrap="none" rtlCol="0">
+            <a:spAutoFit/>
+          </a:bodyPr>
+          <a:lstStyle/>
+          <a:p>
+            <a:r>
+              <a:rPr lang="en-US" smtClean="0"/>
+              <a:t>Start point</a:t>
+            </a:r>
+            <a:endParaRPr lang="en-US"/>
+          </a:p>
+        </p:txBody>
+      </p:sp>
+      <p:cxnSp>
+        <p:nvCxnSpPr>
+          <p:cNvPr id="24" name="Straight Arrow Connector 23"/>
+          <p:cNvCxnSpPr/>
+          <p:nvPr/>
+        </p:nvCxnSpPr>
+        <p:spPr>
+          <a:xfrm flipH="1">
+            <a:off x="3206944" y="1926762"/>
+            <a:ext cx="124356" cy="565857"/>
+          </a:xfrm>
+          <a:prstGeom prst="straightConnector1">
+            <a:avLst/>
+          </a:prstGeom>
+          <a:ln>
+            <a:tailEnd type="triangle"/>
+          </a:ln>
+        </p:spPr>
+        <p:style>
+          <a:lnRef idx="1">
+            <a:schemeClr val="accent1"/>
+          </a:lnRef>
+          <a:fillRef idx="0">
+            <a:schemeClr val="accent1"/>
+          </a:fillRef>
+          <a:effectRef idx="0">
+            <a:schemeClr val="accent1"/>
+          </a:effectRef>
+          <a:fontRef idx="minor">
+            <a:schemeClr val="tx1"/>
+          </a:fontRef>
+        </p:style>
+      </p:cxnSp>
+    </p:spTree>
+    <p:extLst>
+      <p:ext uri="{BB962C8B-B14F-4D97-AF65-F5344CB8AC3E}">
+        <p14:creationId xmlns:p14="http://schemas.microsoft.com/office/powerpoint/2010/main" val="1299228398"/>
+      </p:ext>
+    </p:extLst>
+  </p:cSld>
+  <p:clrMapOvr>
+    <a:masterClrMapping/>
+  </p:clrMapOvr>
+</p:sld>
+</file>
+
+<file path=ppt/slides/slide18.xml><?xml version="1.0" encoding="utf-8"?>
+<p:sld xmlns:a="http://schemas.openxmlformats.org/drawingml/2006/main" xmlns:r="http://schemas.openxmlformats.org/officeDocument/2006/relationships" xmlns:p="http://schemas.openxmlformats.org/presentationml/2006/main">
+  <p:cSld>
+    <p:spTree>
+      <p:nvGrpSpPr>
+        <p:cNvPr id="1" name=""/>
+        <p:cNvGrpSpPr/>
+        <p:nvPr/>
+      </p:nvGrpSpPr>
+      <p:grpSpPr>
+        <a:xfrm>
+          <a:off x="0" y="0"/>
+          <a:ext cx="0" cy="0"/>
+          <a:chOff x="0" y="0"/>
+          <a:chExt cx="0" cy="0"/>
+        </a:xfrm>
+      </p:grpSpPr>
+      <p:sp>
+        <p:nvSpPr>
+          <p:cNvPr id="2" name="Title 1"/>
+          <p:cNvSpPr>
+            <a:spLocks noGrp="1"/>
+          </p:cNvSpPr>
+          <p:nvPr>
+            <p:ph type="title"/>
+          </p:nvPr>
+        </p:nvSpPr>
+        <p:spPr>
+          <a:xfrm>
+            <a:off x="515471" y="365213"/>
+            <a:ext cx="10515600" cy="895031"/>
+          </a:xfrm>
+        </p:spPr>
+        <p:txBody>
+          <a:bodyPr/>
+          <a:lstStyle/>
+          <a:p>
+            <a:r>
+              <a:rPr lang="en-US" smtClean="0"/>
+              <a:t>RING BUFFER ( SIZE = 8)</a:t>
+            </a:r>
+            <a:endParaRPr lang="en-US"/>
+          </a:p>
+        </p:txBody>
+      </p:sp>
+      <p:sp>
+        <p:nvSpPr>
+          <p:cNvPr id="4" name="Oval 3"/>
+          <p:cNvSpPr/>
+          <p:nvPr/>
+        </p:nvSpPr>
+        <p:spPr>
+          <a:xfrm>
+            <a:off x="820272" y="2590572"/>
+            <a:ext cx="2823882" cy="2823882"/>
+          </a:xfrm>
+          <a:prstGeom prst="ellipse">
+            <a:avLst/>
+          </a:prstGeom>
+          <a:noFill/>
+          <a:ln>
+            <a:solidFill>
+              <a:schemeClr val="tx1"/>
+            </a:solidFill>
+          </a:ln>
+        </p:spPr>
+        <p:style>
+          <a:lnRef idx="2">
+            <a:schemeClr val="accent1">
+              <a:shade val="50000"/>
+            </a:schemeClr>
+          </a:lnRef>
+          <a:fillRef idx="1">
+            <a:schemeClr val="accent1"/>
+          </a:fillRef>
+          <a:effectRef idx="0">
+            <a:schemeClr val="accent1"/>
+          </a:effectRef>
+          <a:fontRef idx="minor">
+            <a:schemeClr val="lt1"/>
+          </a:fontRef>
+        </p:style>
+        <p:txBody>
+          <a:bodyPr rtlCol="0" anchor="ctr"/>
+          <a:lstStyle/>
+          <a:p>
+            <a:pPr algn="ctr"/>
+            <a:endParaRPr lang="en-US"/>
+          </a:p>
+        </p:txBody>
+      </p:sp>
+      <p:sp>
+        <p:nvSpPr>
+          <p:cNvPr id="5" name="Oval 4"/>
+          <p:cNvSpPr/>
+          <p:nvPr/>
+        </p:nvSpPr>
+        <p:spPr>
+          <a:xfrm>
+            <a:off x="1156449" y="2922592"/>
+            <a:ext cx="2151530" cy="2151530"/>
+          </a:xfrm>
+          <a:prstGeom prst="ellipse">
+            <a:avLst/>
+          </a:prstGeom>
+          <a:solidFill>
+            <a:schemeClr val="bg1"/>
+          </a:solidFill>
+          <a:ln>
+            <a:solidFill>
+              <a:schemeClr val="tx1"/>
+            </a:solidFill>
+          </a:ln>
+        </p:spPr>
+        <p:style>
+          <a:lnRef idx="2">
+            <a:schemeClr val="accent1">
+              <a:shade val="50000"/>
+            </a:schemeClr>
+          </a:lnRef>
+          <a:fillRef idx="1">
+            <a:schemeClr val="accent1"/>
+          </a:fillRef>
+          <a:effectRef idx="0">
+            <a:schemeClr val="accent1"/>
+          </a:effectRef>
+          <a:fontRef idx="minor">
+            <a:schemeClr val="lt1"/>
+          </a:fontRef>
+        </p:style>
+        <p:txBody>
+          <a:bodyPr rtlCol="0" anchor="ctr"/>
+          <a:lstStyle/>
+          <a:p>
+            <a:pPr algn="ctr"/>
+            <a:endParaRPr lang="en-US"/>
+          </a:p>
+        </p:txBody>
+      </p:sp>
+      <p:cxnSp>
+        <p:nvCxnSpPr>
+          <p:cNvPr id="7" name="Straight Connector 6"/>
+          <p:cNvCxnSpPr>
+            <a:stCxn id="4" idx="1"/>
+            <a:endCxn id="5" idx="1"/>
+          </p:cNvCxnSpPr>
+          <p:nvPr/>
+        </p:nvCxnSpPr>
+        <p:spPr>
+          <a:xfrm>
+            <a:off x="1233820" y="3004120"/>
+            <a:ext cx="237713" cy="233556"/>
+          </a:xfrm>
+          <a:prstGeom prst="line">
+            <a:avLst/>
+          </a:prstGeom>
+        </p:spPr>
+        <p:style>
+          <a:lnRef idx="1">
+            <a:schemeClr val="accent1"/>
+          </a:lnRef>
+          <a:fillRef idx="0">
+            <a:schemeClr val="accent1"/>
+          </a:fillRef>
+          <a:effectRef idx="0">
+            <a:schemeClr val="accent1"/>
+          </a:effectRef>
+          <a:fontRef idx="minor">
+            <a:schemeClr val="tx1"/>
+          </a:fontRef>
+        </p:style>
+      </p:cxnSp>
+      <p:cxnSp>
+        <p:nvCxnSpPr>
+          <p:cNvPr id="9" name="Straight Connector 8"/>
+          <p:cNvCxnSpPr>
+            <a:stCxn id="4" idx="0"/>
+            <a:endCxn id="5" idx="0"/>
+          </p:cNvCxnSpPr>
+          <p:nvPr/>
+        </p:nvCxnSpPr>
+        <p:spPr>
+          <a:xfrm>
+            <a:off x="2232213" y="2590572"/>
+            <a:ext cx="1" cy="332020"/>
+          </a:xfrm>
+          <a:prstGeom prst="line">
+            <a:avLst/>
+          </a:prstGeom>
+        </p:spPr>
+        <p:style>
+          <a:lnRef idx="1">
+            <a:schemeClr val="accent1"/>
+          </a:lnRef>
+          <a:fillRef idx="0">
+            <a:schemeClr val="accent1"/>
+          </a:fillRef>
+          <a:effectRef idx="0">
+            <a:schemeClr val="accent1"/>
+          </a:effectRef>
+          <a:fontRef idx="minor">
+            <a:schemeClr val="tx1"/>
+          </a:fontRef>
+        </p:style>
+      </p:cxnSp>
+      <p:cxnSp>
+        <p:nvCxnSpPr>
+          <p:cNvPr id="12" name="Straight Connector 11"/>
+          <p:cNvCxnSpPr>
+            <a:stCxn id="4" idx="7"/>
+            <a:endCxn id="5" idx="7"/>
+          </p:cNvCxnSpPr>
+          <p:nvPr/>
+        </p:nvCxnSpPr>
+        <p:spPr>
+          <a:xfrm flipH="1">
+            <a:off x="2992895" y="3004120"/>
+            <a:ext cx="237711" cy="233556"/>
+          </a:xfrm>
+          <a:prstGeom prst="line">
+            <a:avLst/>
+          </a:prstGeom>
+        </p:spPr>
+        <p:style>
+          <a:lnRef idx="1">
+            <a:schemeClr val="accent1"/>
+          </a:lnRef>
+          <a:fillRef idx="0">
+            <a:schemeClr val="accent1"/>
+          </a:fillRef>
+          <a:effectRef idx="0">
+            <a:schemeClr val="accent1"/>
+          </a:effectRef>
+          <a:fontRef idx="minor">
+            <a:schemeClr val="tx1"/>
+          </a:fontRef>
+        </p:style>
+      </p:cxnSp>
+      <p:cxnSp>
+        <p:nvCxnSpPr>
+          <p:cNvPr id="14" name="Straight Connector 13"/>
+          <p:cNvCxnSpPr>
+            <a:stCxn id="5" idx="6"/>
+            <a:endCxn id="4" idx="6"/>
+          </p:cNvCxnSpPr>
+          <p:nvPr/>
+        </p:nvCxnSpPr>
+        <p:spPr>
+          <a:xfrm>
+            <a:off x="3307979" y="3998357"/>
+            <a:ext cx="336175" cy="4156"/>
+          </a:xfrm>
+          <a:prstGeom prst="line">
+            <a:avLst/>
+          </a:prstGeom>
+        </p:spPr>
+        <p:style>
+          <a:lnRef idx="1">
+            <a:schemeClr val="accent1"/>
+          </a:lnRef>
+          <a:fillRef idx="0">
+            <a:schemeClr val="accent1"/>
+          </a:fillRef>
+          <a:effectRef idx="0">
+            <a:schemeClr val="accent1"/>
+          </a:effectRef>
+          <a:fontRef idx="minor">
+            <a:schemeClr val="tx1"/>
+          </a:fontRef>
+        </p:style>
+      </p:cxnSp>
+      <p:cxnSp>
+        <p:nvCxnSpPr>
+          <p:cNvPr id="16" name="Straight Connector 15"/>
+          <p:cNvCxnSpPr>
+            <a:stCxn id="5" idx="5"/>
+            <a:endCxn id="4" idx="5"/>
+          </p:cNvCxnSpPr>
+          <p:nvPr/>
+        </p:nvCxnSpPr>
+        <p:spPr>
+          <a:xfrm>
+            <a:off x="2992895" y="4759038"/>
+            <a:ext cx="237711" cy="241868"/>
+          </a:xfrm>
+          <a:prstGeom prst="line">
+            <a:avLst/>
+          </a:prstGeom>
+        </p:spPr>
+        <p:style>
+          <a:lnRef idx="1">
+            <a:schemeClr val="accent1"/>
+          </a:lnRef>
+          <a:fillRef idx="0">
+            <a:schemeClr val="accent1"/>
+          </a:fillRef>
+          <a:effectRef idx="0">
+            <a:schemeClr val="accent1"/>
+          </a:effectRef>
+          <a:fontRef idx="minor">
+            <a:schemeClr val="tx1"/>
+          </a:fontRef>
+        </p:style>
+      </p:cxnSp>
+      <p:cxnSp>
+        <p:nvCxnSpPr>
+          <p:cNvPr id="18" name="Straight Connector 17"/>
+          <p:cNvCxnSpPr>
+            <a:stCxn id="5" idx="4"/>
+            <a:endCxn id="4" idx="4"/>
+          </p:cNvCxnSpPr>
+          <p:nvPr/>
+        </p:nvCxnSpPr>
+        <p:spPr>
+          <a:xfrm flipH="1">
+            <a:off x="2232213" y="5074122"/>
+            <a:ext cx="1" cy="340332"/>
+          </a:xfrm>
+          <a:prstGeom prst="line">
+            <a:avLst/>
+          </a:prstGeom>
+        </p:spPr>
+        <p:style>
+          <a:lnRef idx="1">
+            <a:schemeClr val="accent1"/>
+          </a:lnRef>
+          <a:fillRef idx="0">
+            <a:schemeClr val="accent1"/>
+          </a:fillRef>
+          <a:effectRef idx="0">
+            <a:schemeClr val="accent1"/>
+          </a:effectRef>
+          <a:fontRef idx="minor">
+            <a:schemeClr val="tx1"/>
+          </a:fontRef>
+        </p:style>
+      </p:cxnSp>
+      <p:cxnSp>
+        <p:nvCxnSpPr>
+          <p:cNvPr id="20" name="Straight Connector 19"/>
+          <p:cNvCxnSpPr>
+            <a:stCxn id="5" idx="3"/>
+            <a:endCxn id="4" idx="3"/>
+          </p:cNvCxnSpPr>
+          <p:nvPr/>
+        </p:nvCxnSpPr>
+        <p:spPr>
+          <a:xfrm flipH="1">
+            <a:off x="1233820" y="4759038"/>
+            <a:ext cx="237713" cy="241868"/>
+          </a:xfrm>
+          <a:prstGeom prst="line">
+            <a:avLst/>
+          </a:prstGeom>
+        </p:spPr>
+        <p:style>
+          <a:lnRef idx="1">
+            <a:schemeClr val="accent1"/>
+          </a:lnRef>
+          <a:fillRef idx="0">
+            <a:schemeClr val="accent1"/>
+          </a:fillRef>
+          <a:effectRef idx="0">
+            <a:schemeClr val="accent1"/>
+          </a:effectRef>
+          <a:fontRef idx="minor">
+            <a:schemeClr val="tx1"/>
+          </a:fontRef>
+        </p:style>
+      </p:cxnSp>
+      <p:cxnSp>
+        <p:nvCxnSpPr>
+          <p:cNvPr id="22" name="Straight Connector 21"/>
+          <p:cNvCxnSpPr>
+            <a:stCxn id="4" idx="2"/>
+            <a:endCxn id="5" idx="2"/>
+          </p:cNvCxnSpPr>
+          <p:nvPr/>
+        </p:nvCxnSpPr>
+        <p:spPr>
+          <a:xfrm flipV="1">
+            <a:off x="820272" y="3998357"/>
+            <a:ext cx="336177" cy="4156"/>
+          </a:xfrm>
+          <a:prstGeom prst="line">
+            <a:avLst/>
+          </a:prstGeom>
+        </p:spPr>
+        <p:style>
+          <a:lnRef idx="1">
+            <a:schemeClr val="accent1"/>
+          </a:lnRef>
+          <a:fillRef idx="0">
+            <a:schemeClr val="accent1"/>
+          </a:fillRef>
+          <a:effectRef idx="0">
+            <a:schemeClr val="accent1"/>
+          </a:effectRef>
+          <a:fontRef idx="minor">
+            <a:schemeClr val="tx1"/>
+          </a:fontRef>
+        </p:style>
+      </p:cxnSp>
+      <p:sp>
+        <p:nvSpPr>
+          <p:cNvPr id="25" name="TextBox 24"/>
+          <p:cNvSpPr txBox="1"/>
+          <p:nvPr/>
+        </p:nvSpPr>
+        <p:spPr>
+          <a:xfrm rot="1381600">
+            <a:off x="2573322" y="1636188"/>
+            <a:ext cx="1605055" cy="369332"/>
+          </a:xfrm>
+          <a:prstGeom prst="rect">
+            <a:avLst/>
+          </a:prstGeom>
+          <a:noFill/>
+        </p:spPr>
+        <p:txBody>
+          <a:bodyPr wrap="none" rtlCol="0">
+            <a:spAutoFit/>
+          </a:bodyPr>
+          <a:lstStyle/>
+          <a:p>
+            <a:r>
+              <a:rPr lang="en-US" smtClean="0"/>
+              <a:t>Write </a:t>
+            </a:r>
+            <a:r>
+              <a:rPr lang="en-US" smtClean="0"/>
+              <a:t>index = 0</a:t>
+            </a:r>
+            <a:endParaRPr lang="en-US"/>
+          </a:p>
+        </p:txBody>
+      </p:sp>
+      <p:cxnSp>
+        <p:nvCxnSpPr>
+          <p:cNvPr id="27" name="Straight Arrow Connector 26"/>
+          <p:cNvCxnSpPr/>
+          <p:nvPr/>
+        </p:nvCxnSpPr>
+        <p:spPr>
+          <a:xfrm flipH="1" flipV="1">
+            <a:off x="3691985" y="3969199"/>
+            <a:ext cx="515424" cy="483816"/>
+          </a:xfrm>
+          <a:prstGeom prst="straightConnector1">
+            <a:avLst/>
+          </a:prstGeom>
+          <a:ln>
+            <a:tailEnd type="triangle"/>
+          </a:ln>
+        </p:spPr>
+        <p:style>
+          <a:lnRef idx="1">
+            <a:schemeClr val="accent1"/>
+          </a:lnRef>
+          <a:fillRef idx="0">
+            <a:schemeClr val="accent1"/>
+          </a:fillRef>
+          <a:effectRef idx="0">
+            <a:schemeClr val="accent1"/>
+          </a:effectRef>
+          <a:fontRef idx="minor">
+            <a:schemeClr val="tx1"/>
+          </a:fontRef>
+        </p:style>
+      </p:cxnSp>
+      <p:sp>
+        <p:nvSpPr>
+          <p:cNvPr id="29" name="TextBox 28"/>
+          <p:cNvSpPr txBox="1"/>
+          <p:nvPr/>
+        </p:nvSpPr>
+        <p:spPr>
+          <a:xfrm rot="2601043">
+            <a:off x="3814362" y="4322316"/>
+            <a:ext cx="1586847" cy="369332"/>
+          </a:xfrm>
+          <a:prstGeom prst="rect">
+            <a:avLst/>
+          </a:prstGeom>
+          <a:noFill/>
+        </p:spPr>
+        <p:txBody>
+          <a:bodyPr wrap="square" rtlCol="0">
+            <a:spAutoFit/>
+          </a:bodyPr>
+          <a:lstStyle/>
+          <a:p>
+            <a:r>
+              <a:rPr lang="en-US" smtClean="0"/>
+              <a:t>Read </a:t>
+            </a:r>
+            <a:r>
+              <a:rPr lang="en-US" smtClean="0"/>
+              <a:t>index = 2</a:t>
+            </a:r>
+            <a:endParaRPr lang="en-US"/>
+          </a:p>
+        </p:txBody>
+      </p:sp>
+      <p:cxnSp>
+        <p:nvCxnSpPr>
+          <p:cNvPr id="30" name="Straight Arrow Connector 29"/>
+          <p:cNvCxnSpPr/>
+          <p:nvPr/>
+        </p:nvCxnSpPr>
+        <p:spPr>
+          <a:xfrm flipH="1">
+            <a:off x="2381617" y="1854545"/>
+            <a:ext cx="557989" cy="683992"/>
+          </a:xfrm>
+          <a:prstGeom prst="straightConnector1">
+            <a:avLst/>
+          </a:prstGeom>
+          <a:ln>
+            <a:tailEnd type="triangle"/>
+          </a:ln>
+        </p:spPr>
+        <p:style>
+          <a:lnRef idx="1">
+            <a:schemeClr val="accent1"/>
+          </a:lnRef>
+          <a:fillRef idx="0">
+            <a:schemeClr val="accent1"/>
+          </a:fillRef>
+          <a:effectRef idx="0">
+            <a:schemeClr val="accent1"/>
+          </a:effectRef>
+          <a:fontRef idx="minor">
+            <a:schemeClr val="tx1"/>
+          </a:fontRef>
+        </p:style>
+      </p:cxnSp>
+      <p:sp>
+        <p:nvSpPr>
+          <p:cNvPr id="37" name="Arc 36"/>
+          <p:cNvSpPr/>
+          <p:nvPr/>
+        </p:nvSpPr>
+        <p:spPr>
+          <a:xfrm rot="3361383">
+            <a:off x="1185902" y="3806629"/>
+            <a:ext cx="2299269" cy="2534984"/>
+          </a:xfrm>
+          <a:prstGeom prst="arc">
+            <a:avLst>
+              <a:gd name="adj1" fmla="val 17435477"/>
+              <a:gd name="adj2" fmla="val 2814004"/>
+            </a:avLst>
+          </a:prstGeom>
+          <a:ln>
+            <a:headEnd type="stealth"/>
+            <a:tailEnd type="stealth"/>
+          </a:ln>
+        </p:spPr>
+        <p:style>
+          <a:lnRef idx="1">
+            <a:schemeClr val="accent1"/>
+          </a:lnRef>
+          <a:fillRef idx="0">
+            <a:schemeClr val="accent1"/>
+          </a:fillRef>
+          <a:effectRef idx="0">
+            <a:schemeClr val="accent1"/>
+          </a:effectRef>
+          <a:fontRef idx="minor">
+            <a:schemeClr val="tx1"/>
+          </a:fontRef>
+        </p:style>
+        <p:txBody>
+          <a:bodyPr rtlCol="0" anchor="ctr"/>
+          <a:lstStyle/>
+          <a:p>
+            <a:pPr algn="ctr"/>
+            <a:endParaRPr lang="en-US"/>
+          </a:p>
+        </p:txBody>
+      </p:sp>
+      <p:sp>
+        <p:nvSpPr>
+          <p:cNvPr id="38" name="TextBox 37"/>
+          <p:cNvSpPr txBox="1"/>
+          <p:nvPr/>
+        </p:nvSpPr>
+        <p:spPr>
+          <a:xfrm>
+            <a:off x="838294" y="6016442"/>
+            <a:ext cx="3190810" cy="369332"/>
+          </a:xfrm>
+          <a:prstGeom prst="rect">
+            <a:avLst/>
+          </a:prstGeom>
+          <a:noFill/>
+        </p:spPr>
+        <p:txBody>
+          <a:bodyPr wrap="none" rtlCol="0">
+            <a:spAutoFit/>
+          </a:bodyPr>
+          <a:lstStyle/>
+          <a:p>
+            <a:r>
+              <a:rPr lang="en-US" smtClean="0"/>
+              <a:t>Khi 1 bytes dữ liệu được ghi vào</a:t>
+            </a:r>
+            <a:endParaRPr lang="en-US"/>
+          </a:p>
+        </p:txBody>
+      </p:sp>
+      <p:sp>
+        <p:nvSpPr>
+          <p:cNvPr id="39" name="TextBox 38"/>
+          <p:cNvSpPr txBox="1"/>
+          <p:nvPr/>
+        </p:nvSpPr>
+        <p:spPr>
+          <a:xfrm>
+            <a:off x="5514184" y="1509571"/>
+            <a:ext cx="6561275" cy="2031325"/>
+          </a:xfrm>
+          <a:prstGeom prst="rect">
+            <a:avLst/>
+          </a:prstGeom>
+          <a:noFill/>
+        </p:spPr>
+        <p:txBody>
+          <a:bodyPr wrap="square" rtlCol="0">
+            <a:spAutoFit/>
+          </a:bodyPr>
+          <a:lstStyle/>
+          <a:p>
+            <a:pPr marL="285750" indent="-285750">
+              <a:buFont typeface="Wingdings" panose="05000000000000000000" pitchFamily="2" charset="2"/>
+              <a:buChar char="§"/>
+            </a:pPr>
+            <a:r>
+              <a:rPr lang="en-US" smtClean="0"/>
+              <a:t>Với cách trên có cách tính số unit trống như sau:</a:t>
+            </a:r>
+          </a:p>
+          <a:p>
+            <a:pPr marL="285750" indent="-285750">
+              <a:buFont typeface="Wingdings" panose="05000000000000000000" pitchFamily="2" charset="2"/>
+              <a:buChar char="§"/>
+            </a:pPr>
+            <a:r>
+              <a:rPr lang="en-US" smtClean="0"/>
+              <a:t>Số byte còn trống có thể ghi được:</a:t>
+            </a:r>
+          </a:p>
+          <a:p>
+            <a:r>
+              <a:rPr lang="en-US" smtClean="0"/>
+              <a:t>size – (write index – read index) -1 </a:t>
+            </a:r>
+            <a:endParaRPr lang="en-US" smtClean="0"/>
+          </a:p>
+          <a:p>
+            <a:r>
+              <a:rPr lang="en-US" smtClean="0"/>
+              <a:t>Còn giữ lại 1 vị trí cuối để phân biệt khi nào buffer đã được đọc hết, hoặc khi nào buffer không còn byte trống để ghi..</a:t>
+            </a:r>
+          </a:p>
+          <a:p>
+            <a:endParaRPr lang="en-US"/>
+          </a:p>
+          <a:p>
+            <a:r>
+              <a:rPr lang="en-US" smtClean="0"/>
+              <a:t>Số byte còn trống có thể đọc được = 1 = write index – read  </a:t>
+            </a:r>
+            <a:r>
+              <a:rPr lang="en-US" smtClean="0"/>
+              <a:t>index</a:t>
+            </a:r>
+            <a:endParaRPr lang="en-US" smtClean="0"/>
+          </a:p>
+        </p:txBody>
+      </p:sp>
+      <p:cxnSp>
+        <p:nvCxnSpPr>
+          <p:cNvPr id="6" name="Straight Connector 5"/>
+          <p:cNvCxnSpPr/>
+          <p:nvPr/>
+        </p:nvCxnSpPr>
+        <p:spPr>
+          <a:xfrm>
+            <a:off x="2232213" y="2082151"/>
+            <a:ext cx="0" cy="3832412"/>
+          </a:xfrm>
+          <a:prstGeom prst="line">
+            <a:avLst/>
+          </a:prstGeom>
+          <a:ln>
+            <a:prstDash val="dash"/>
+          </a:ln>
+        </p:spPr>
+        <p:style>
+          <a:lnRef idx="1">
+            <a:schemeClr val="accent1"/>
+          </a:lnRef>
+          <a:fillRef idx="0">
+            <a:schemeClr val="accent1"/>
+          </a:fillRef>
+          <a:effectRef idx="0">
+            <a:schemeClr val="accent1"/>
+          </a:effectRef>
+          <a:fontRef idx="minor">
+            <a:schemeClr val="tx1"/>
+          </a:fontRef>
+        </p:style>
+      </p:cxnSp>
+      <p:sp>
+        <p:nvSpPr>
+          <p:cNvPr id="8" name="TextBox 7"/>
+          <p:cNvSpPr txBox="1"/>
+          <p:nvPr/>
+        </p:nvSpPr>
+        <p:spPr>
+          <a:xfrm>
+            <a:off x="2614019" y="2718371"/>
+            <a:ext cx="325587" cy="369332"/>
+          </a:xfrm>
+          <a:prstGeom prst="rect">
+            <a:avLst/>
+          </a:prstGeom>
+          <a:noFill/>
+          <a:ln>
+            <a:solidFill>
+              <a:srgbClr val="FFFFFF"/>
+            </a:solidFill>
+          </a:ln>
+        </p:spPr>
+        <p:txBody>
+          <a:bodyPr wrap="square" rtlCol="0">
+            <a:spAutoFit/>
+          </a:bodyPr>
+          <a:lstStyle/>
+          <a:p>
+            <a:r>
+              <a:rPr lang="en-US" smtClean="0"/>
+              <a:t>A</a:t>
+            </a:r>
+            <a:endParaRPr lang="en-US"/>
+          </a:p>
+        </p:txBody>
+      </p:sp>
+    </p:spTree>
+    <p:extLst>
+      <p:ext uri="{BB962C8B-B14F-4D97-AF65-F5344CB8AC3E}">
+        <p14:creationId xmlns:p14="http://schemas.microsoft.com/office/powerpoint/2010/main" val="162040489"/>
+      </p:ext>
+    </p:extLst>
+  </p:cSld>
+  <p:clrMapOvr>
+    <a:masterClrMapping/>
+  </p:clrMapOvr>
+</p:sld>
+</file>
+
+<file path=ppt/slides/slide19.xml><?xml version="1.0" encoding="utf-8"?>
+<p:sld xmlns:a="http://schemas.openxmlformats.org/drawingml/2006/main" xmlns:r="http://schemas.openxmlformats.org/officeDocument/2006/relationships" xmlns:p="http://schemas.openxmlformats.org/presentationml/2006/main">
+  <p:cSld>
+    <p:spTree>
+      <p:nvGrpSpPr>
+        <p:cNvPr id="1" name=""/>
+        <p:cNvGrpSpPr/>
+        <p:nvPr/>
+      </p:nvGrpSpPr>
+      <p:grpSpPr>
+        <a:xfrm>
+          <a:off x="0" y="0"/>
+          <a:ext cx="0" cy="0"/>
+          <a:chOff x="0" y="0"/>
+          <a:chExt cx="0" cy="0"/>
+        </a:xfrm>
+      </p:grpSpPr>
+      <p:sp>
+        <p:nvSpPr>
+          <p:cNvPr id="2" name="Title 1"/>
+          <p:cNvSpPr>
+            <a:spLocks noGrp="1"/>
+          </p:cNvSpPr>
+          <p:nvPr>
+            <p:ph type="title"/>
+          </p:nvPr>
+        </p:nvSpPr>
+        <p:spPr>
+          <a:xfrm>
+            <a:off x="515471" y="365213"/>
+            <a:ext cx="10515600" cy="895031"/>
+          </a:xfrm>
+        </p:spPr>
+        <p:txBody>
+          <a:bodyPr/>
+          <a:lstStyle/>
+          <a:p>
+            <a:r>
+              <a:rPr lang="en-US" smtClean="0"/>
+              <a:t>RING BUFFER ( SIZE = 8)</a:t>
+            </a:r>
+            <a:endParaRPr lang="en-US"/>
+          </a:p>
+        </p:txBody>
+      </p:sp>
+      <p:sp>
+        <p:nvSpPr>
+          <p:cNvPr id="4" name="Oval 3"/>
+          <p:cNvSpPr/>
+          <p:nvPr/>
+        </p:nvSpPr>
+        <p:spPr>
+          <a:xfrm>
+            <a:off x="820272" y="2590572"/>
+            <a:ext cx="2823882" cy="2823882"/>
+          </a:xfrm>
+          <a:prstGeom prst="ellipse">
+            <a:avLst/>
+          </a:prstGeom>
+          <a:noFill/>
+          <a:ln>
+            <a:solidFill>
+              <a:schemeClr val="tx1"/>
+            </a:solidFill>
+          </a:ln>
+        </p:spPr>
+        <p:style>
+          <a:lnRef idx="2">
+            <a:schemeClr val="accent1">
+              <a:shade val="50000"/>
+            </a:schemeClr>
+          </a:lnRef>
+          <a:fillRef idx="1">
+            <a:schemeClr val="accent1"/>
+          </a:fillRef>
+          <a:effectRef idx="0">
+            <a:schemeClr val="accent1"/>
+          </a:effectRef>
+          <a:fontRef idx="minor">
+            <a:schemeClr val="lt1"/>
+          </a:fontRef>
+        </p:style>
+        <p:txBody>
+          <a:bodyPr rtlCol="0" anchor="ctr"/>
+          <a:lstStyle/>
+          <a:p>
+            <a:pPr algn="ctr"/>
+            <a:endParaRPr lang="en-US"/>
+          </a:p>
+        </p:txBody>
+      </p:sp>
+      <p:sp>
+        <p:nvSpPr>
+          <p:cNvPr id="5" name="Oval 4"/>
+          <p:cNvSpPr/>
+          <p:nvPr/>
+        </p:nvSpPr>
+        <p:spPr>
+          <a:xfrm>
+            <a:off x="1156449" y="2922592"/>
+            <a:ext cx="2151530" cy="2151530"/>
+          </a:xfrm>
+          <a:prstGeom prst="ellipse">
+            <a:avLst/>
+          </a:prstGeom>
+          <a:solidFill>
+            <a:schemeClr val="bg1"/>
+          </a:solidFill>
+          <a:ln>
+            <a:solidFill>
+              <a:schemeClr val="tx1"/>
+            </a:solidFill>
+          </a:ln>
+        </p:spPr>
+        <p:style>
+          <a:lnRef idx="2">
+            <a:schemeClr val="accent1">
+              <a:shade val="50000"/>
+            </a:schemeClr>
+          </a:lnRef>
+          <a:fillRef idx="1">
+            <a:schemeClr val="accent1"/>
+          </a:fillRef>
+          <a:effectRef idx="0">
+            <a:schemeClr val="accent1"/>
+          </a:effectRef>
+          <a:fontRef idx="minor">
+            <a:schemeClr val="lt1"/>
+          </a:fontRef>
+        </p:style>
+        <p:txBody>
+          <a:bodyPr rtlCol="0" anchor="ctr"/>
+          <a:lstStyle/>
+          <a:p>
+            <a:pPr algn="ctr"/>
+            <a:endParaRPr lang="en-US"/>
+          </a:p>
+        </p:txBody>
+      </p:sp>
+      <p:cxnSp>
+        <p:nvCxnSpPr>
+          <p:cNvPr id="7" name="Straight Connector 6"/>
+          <p:cNvCxnSpPr>
+            <a:stCxn id="4" idx="1"/>
+            <a:endCxn id="5" idx="1"/>
+          </p:cNvCxnSpPr>
+          <p:nvPr/>
+        </p:nvCxnSpPr>
+        <p:spPr>
+          <a:xfrm>
+            <a:off x="1233820" y="3004120"/>
+            <a:ext cx="237713" cy="233556"/>
+          </a:xfrm>
+          <a:prstGeom prst="line">
+            <a:avLst/>
+          </a:prstGeom>
+        </p:spPr>
+        <p:style>
+          <a:lnRef idx="1">
+            <a:schemeClr val="accent1"/>
+          </a:lnRef>
+          <a:fillRef idx="0">
+            <a:schemeClr val="accent1"/>
+          </a:fillRef>
+          <a:effectRef idx="0">
+            <a:schemeClr val="accent1"/>
+          </a:effectRef>
+          <a:fontRef idx="minor">
+            <a:schemeClr val="tx1"/>
+          </a:fontRef>
+        </p:style>
+      </p:cxnSp>
+      <p:cxnSp>
+        <p:nvCxnSpPr>
+          <p:cNvPr id="9" name="Straight Connector 8"/>
+          <p:cNvCxnSpPr>
+            <a:stCxn id="4" idx="0"/>
+            <a:endCxn id="5" idx="0"/>
+          </p:cNvCxnSpPr>
+          <p:nvPr/>
+        </p:nvCxnSpPr>
+        <p:spPr>
+          <a:xfrm>
+            <a:off x="2232213" y="2590572"/>
+            <a:ext cx="1" cy="332020"/>
+          </a:xfrm>
+          <a:prstGeom prst="line">
+            <a:avLst/>
+          </a:prstGeom>
+        </p:spPr>
+        <p:style>
+          <a:lnRef idx="1">
+            <a:schemeClr val="accent1"/>
+          </a:lnRef>
+          <a:fillRef idx="0">
+            <a:schemeClr val="accent1"/>
+          </a:fillRef>
+          <a:effectRef idx="0">
+            <a:schemeClr val="accent1"/>
+          </a:effectRef>
+          <a:fontRef idx="minor">
+            <a:schemeClr val="tx1"/>
+          </a:fontRef>
+        </p:style>
+      </p:cxnSp>
+      <p:cxnSp>
+        <p:nvCxnSpPr>
+          <p:cNvPr id="12" name="Straight Connector 11"/>
+          <p:cNvCxnSpPr>
+            <a:stCxn id="4" idx="7"/>
+            <a:endCxn id="5" idx="7"/>
+          </p:cNvCxnSpPr>
+          <p:nvPr/>
+        </p:nvCxnSpPr>
+        <p:spPr>
+          <a:xfrm flipH="1">
+            <a:off x="2992895" y="3004120"/>
+            <a:ext cx="237711" cy="233556"/>
+          </a:xfrm>
+          <a:prstGeom prst="line">
+            <a:avLst/>
+          </a:prstGeom>
+        </p:spPr>
+        <p:style>
+          <a:lnRef idx="1">
+            <a:schemeClr val="accent1"/>
+          </a:lnRef>
+          <a:fillRef idx="0">
+            <a:schemeClr val="accent1"/>
+          </a:fillRef>
+          <a:effectRef idx="0">
+            <a:schemeClr val="accent1"/>
+          </a:effectRef>
+          <a:fontRef idx="minor">
+            <a:schemeClr val="tx1"/>
+          </a:fontRef>
+        </p:style>
+      </p:cxnSp>
+      <p:cxnSp>
+        <p:nvCxnSpPr>
+          <p:cNvPr id="14" name="Straight Connector 13"/>
+          <p:cNvCxnSpPr>
+            <a:stCxn id="5" idx="6"/>
+            <a:endCxn id="4" idx="6"/>
+          </p:cNvCxnSpPr>
+          <p:nvPr/>
+        </p:nvCxnSpPr>
+        <p:spPr>
+          <a:xfrm>
+            <a:off x="3307979" y="3998357"/>
+            <a:ext cx="336175" cy="4156"/>
+          </a:xfrm>
+          <a:prstGeom prst="line">
+            <a:avLst/>
+          </a:prstGeom>
+        </p:spPr>
+        <p:style>
+          <a:lnRef idx="1">
+            <a:schemeClr val="accent1"/>
+          </a:lnRef>
+          <a:fillRef idx="0">
+            <a:schemeClr val="accent1"/>
+          </a:fillRef>
+          <a:effectRef idx="0">
+            <a:schemeClr val="accent1"/>
+          </a:effectRef>
+          <a:fontRef idx="minor">
+            <a:schemeClr val="tx1"/>
+          </a:fontRef>
+        </p:style>
+      </p:cxnSp>
+      <p:cxnSp>
+        <p:nvCxnSpPr>
+          <p:cNvPr id="16" name="Straight Connector 15"/>
+          <p:cNvCxnSpPr>
+            <a:stCxn id="5" idx="5"/>
+            <a:endCxn id="4" idx="5"/>
+          </p:cNvCxnSpPr>
+          <p:nvPr/>
+        </p:nvCxnSpPr>
+        <p:spPr>
+          <a:xfrm>
+            <a:off x="2992895" y="4759038"/>
+            <a:ext cx="237711" cy="241868"/>
+          </a:xfrm>
+          <a:prstGeom prst="line">
+            <a:avLst/>
+          </a:prstGeom>
+        </p:spPr>
+        <p:style>
+          <a:lnRef idx="1">
+            <a:schemeClr val="accent1"/>
+          </a:lnRef>
+          <a:fillRef idx="0">
+            <a:schemeClr val="accent1"/>
+          </a:fillRef>
+          <a:effectRef idx="0">
+            <a:schemeClr val="accent1"/>
+          </a:effectRef>
+          <a:fontRef idx="minor">
+            <a:schemeClr val="tx1"/>
+          </a:fontRef>
+        </p:style>
+      </p:cxnSp>
+      <p:cxnSp>
+        <p:nvCxnSpPr>
+          <p:cNvPr id="18" name="Straight Connector 17"/>
+          <p:cNvCxnSpPr>
+            <a:stCxn id="5" idx="4"/>
+            <a:endCxn id="4" idx="4"/>
+          </p:cNvCxnSpPr>
+          <p:nvPr/>
+        </p:nvCxnSpPr>
+        <p:spPr>
+          <a:xfrm flipH="1">
+            <a:off x="2232213" y="5074122"/>
+            <a:ext cx="1" cy="340332"/>
+          </a:xfrm>
+          <a:prstGeom prst="line">
+            <a:avLst/>
+          </a:prstGeom>
+        </p:spPr>
+        <p:style>
+          <a:lnRef idx="1">
+            <a:schemeClr val="accent1"/>
+          </a:lnRef>
+          <a:fillRef idx="0">
+            <a:schemeClr val="accent1"/>
+          </a:fillRef>
+          <a:effectRef idx="0">
+            <a:schemeClr val="accent1"/>
+          </a:effectRef>
+          <a:fontRef idx="minor">
+            <a:schemeClr val="tx1"/>
+          </a:fontRef>
+        </p:style>
+      </p:cxnSp>
+      <p:cxnSp>
+        <p:nvCxnSpPr>
+          <p:cNvPr id="20" name="Straight Connector 19"/>
+          <p:cNvCxnSpPr>
+            <a:stCxn id="5" idx="3"/>
+            <a:endCxn id="4" idx="3"/>
+          </p:cNvCxnSpPr>
+          <p:nvPr/>
+        </p:nvCxnSpPr>
+        <p:spPr>
+          <a:xfrm flipH="1">
+            <a:off x="1233820" y="4759038"/>
+            <a:ext cx="237713" cy="241868"/>
+          </a:xfrm>
+          <a:prstGeom prst="line">
+            <a:avLst/>
+          </a:prstGeom>
+        </p:spPr>
+        <p:style>
+          <a:lnRef idx="1">
+            <a:schemeClr val="accent1"/>
+          </a:lnRef>
+          <a:fillRef idx="0">
+            <a:schemeClr val="accent1"/>
+          </a:fillRef>
+          <a:effectRef idx="0">
+            <a:schemeClr val="accent1"/>
+          </a:effectRef>
+          <a:fontRef idx="minor">
+            <a:schemeClr val="tx1"/>
+          </a:fontRef>
+        </p:style>
+      </p:cxnSp>
+      <p:cxnSp>
+        <p:nvCxnSpPr>
+          <p:cNvPr id="22" name="Straight Connector 21"/>
+          <p:cNvCxnSpPr>
+            <a:stCxn id="4" idx="2"/>
+            <a:endCxn id="5" idx="2"/>
+          </p:cNvCxnSpPr>
+          <p:nvPr/>
+        </p:nvCxnSpPr>
+        <p:spPr>
+          <a:xfrm flipV="1">
+            <a:off x="820272" y="3998357"/>
+            <a:ext cx="336177" cy="4156"/>
+          </a:xfrm>
+          <a:prstGeom prst="line">
+            <a:avLst/>
+          </a:prstGeom>
+        </p:spPr>
+        <p:style>
+          <a:lnRef idx="1">
+            <a:schemeClr val="accent1"/>
+          </a:lnRef>
+          <a:fillRef idx="0">
+            <a:schemeClr val="accent1"/>
+          </a:fillRef>
+          <a:effectRef idx="0">
+            <a:schemeClr val="accent1"/>
+          </a:effectRef>
+          <a:fontRef idx="minor">
+            <a:schemeClr val="tx1"/>
+          </a:fontRef>
+        </p:style>
+      </p:cxnSp>
+      <p:sp>
+        <p:nvSpPr>
+          <p:cNvPr id="25" name="TextBox 24"/>
+          <p:cNvSpPr txBox="1"/>
+          <p:nvPr/>
+        </p:nvSpPr>
+        <p:spPr>
+          <a:xfrm rot="3504052">
+            <a:off x="3877506" y="2868955"/>
+            <a:ext cx="1605055" cy="369332"/>
+          </a:xfrm>
+          <a:prstGeom prst="rect">
+            <a:avLst/>
+          </a:prstGeom>
+          <a:noFill/>
+        </p:spPr>
+        <p:txBody>
+          <a:bodyPr wrap="none" rtlCol="0">
+            <a:spAutoFit/>
+          </a:bodyPr>
+          <a:lstStyle/>
+          <a:p>
+            <a:r>
+              <a:rPr lang="en-US" smtClean="0"/>
+              <a:t>Write </a:t>
+            </a:r>
+            <a:r>
+              <a:rPr lang="en-US" smtClean="0"/>
+              <a:t>index = 1</a:t>
+            </a:r>
+            <a:endParaRPr lang="en-US"/>
+          </a:p>
+        </p:txBody>
+      </p:sp>
+      <p:cxnSp>
+        <p:nvCxnSpPr>
+          <p:cNvPr id="27" name="Straight Arrow Connector 26"/>
+          <p:cNvCxnSpPr/>
+          <p:nvPr/>
+        </p:nvCxnSpPr>
+        <p:spPr>
+          <a:xfrm flipH="1" flipV="1">
+            <a:off x="3334264" y="3001391"/>
+            <a:ext cx="1109562" cy="2729"/>
+          </a:xfrm>
+          <a:prstGeom prst="straightConnector1">
+            <a:avLst/>
+          </a:prstGeom>
+          <a:ln>
+            <a:tailEnd type="triangle"/>
+          </a:ln>
+        </p:spPr>
+        <p:style>
+          <a:lnRef idx="1">
+            <a:schemeClr val="accent1"/>
+          </a:lnRef>
+          <a:fillRef idx="0">
+            <a:schemeClr val="accent1"/>
+          </a:fillRef>
+          <a:effectRef idx="0">
+            <a:schemeClr val="accent1"/>
+          </a:effectRef>
+          <a:fontRef idx="minor">
+            <a:schemeClr val="tx1"/>
+          </a:fontRef>
+        </p:style>
+      </p:cxnSp>
+      <p:sp>
+        <p:nvSpPr>
+          <p:cNvPr id="29" name="TextBox 28"/>
+          <p:cNvSpPr txBox="1"/>
+          <p:nvPr/>
+        </p:nvSpPr>
+        <p:spPr>
+          <a:xfrm rot="1562124">
+            <a:off x="2241603" y="1497693"/>
+            <a:ext cx="1586847" cy="369332"/>
+          </a:xfrm>
+          <a:prstGeom prst="rect">
+            <a:avLst/>
+          </a:prstGeom>
+          <a:noFill/>
+        </p:spPr>
+        <p:txBody>
+          <a:bodyPr wrap="square" rtlCol="0">
+            <a:spAutoFit/>
+          </a:bodyPr>
+          <a:lstStyle/>
+          <a:p>
+            <a:r>
+              <a:rPr lang="en-US" smtClean="0"/>
+              <a:t>Read </a:t>
+            </a:r>
+            <a:r>
+              <a:rPr lang="en-US" smtClean="0"/>
+              <a:t>index = 0</a:t>
+            </a:r>
+            <a:endParaRPr lang="en-US"/>
+          </a:p>
+        </p:txBody>
+      </p:sp>
+      <p:cxnSp>
+        <p:nvCxnSpPr>
+          <p:cNvPr id="30" name="Straight Arrow Connector 29"/>
+          <p:cNvCxnSpPr/>
+          <p:nvPr/>
+        </p:nvCxnSpPr>
+        <p:spPr>
+          <a:xfrm flipH="1">
+            <a:off x="2381617" y="1854545"/>
+            <a:ext cx="557989" cy="683992"/>
+          </a:xfrm>
+          <a:prstGeom prst="straightConnector1">
+            <a:avLst/>
+          </a:prstGeom>
+          <a:ln>
+            <a:tailEnd type="triangle"/>
+          </a:ln>
+        </p:spPr>
+        <p:style>
+          <a:lnRef idx="1">
+            <a:schemeClr val="accent1"/>
+          </a:lnRef>
+          <a:fillRef idx="0">
+            <a:schemeClr val="accent1"/>
+          </a:fillRef>
+          <a:effectRef idx="0">
+            <a:schemeClr val="accent1"/>
+          </a:effectRef>
+          <a:fontRef idx="minor">
+            <a:schemeClr val="tx1"/>
+          </a:fontRef>
+        </p:style>
+      </p:cxnSp>
+      <p:sp>
+        <p:nvSpPr>
+          <p:cNvPr id="37" name="Arc 36"/>
+          <p:cNvSpPr/>
+          <p:nvPr/>
+        </p:nvSpPr>
+        <p:spPr>
+          <a:xfrm rot="3361383">
+            <a:off x="1449463" y="3214264"/>
+            <a:ext cx="2299269" cy="2534984"/>
+          </a:xfrm>
+          <a:prstGeom prst="arc">
+            <a:avLst>
+              <a:gd name="adj1" fmla="val 17435477"/>
+              <a:gd name="adj2" fmla="val 2814004"/>
+            </a:avLst>
+          </a:prstGeom>
+          <a:ln>
+            <a:headEnd type="stealth"/>
+            <a:tailEnd type="stealth"/>
+          </a:ln>
+        </p:spPr>
+        <p:style>
+          <a:lnRef idx="1">
+            <a:schemeClr val="accent1"/>
+          </a:lnRef>
+          <a:fillRef idx="0">
+            <a:schemeClr val="accent1"/>
+          </a:fillRef>
+          <a:effectRef idx="0">
+            <a:schemeClr val="accent1"/>
+          </a:effectRef>
+          <a:fontRef idx="minor">
+            <a:schemeClr val="tx1"/>
+          </a:fontRef>
+        </p:style>
+        <p:txBody>
+          <a:bodyPr rtlCol="0" anchor="ctr"/>
+          <a:lstStyle/>
+          <a:p>
+            <a:pPr algn="ctr"/>
+            <a:endParaRPr lang="en-US"/>
+          </a:p>
+        </p:txBody>
+      </p:sp>
+      <p:sp>
+        <p:nvSpPr>
+          <p:cNvPr id="38" name="TextBox 37"/>
+          <p:cNvSpPr txBox="1"/>
+          <p:nvPr/>
+        </p:nvSpPr>
+        <p:spPr>
+          <a:xfrm>
+            <a:off x="838294" y="6016442"/>
+            <a:ext cx="3190810" cy="369332"/>
+          </a:xfrm>
+          <a:prstGeom prst="rect">
+            <a:avLst/>
+          </a:prstGeom>
+          <a:noFill/>
+        </p:spPr>
+        <p:txBody>
+          <a:bodyPr wrap="none" rtlCol="0">
+            <a:spAutoFit/>
+          </a:bodyPr>
+          <a:lstStyle/>
+          <a:p>
+            <a:r>
+              <a:rPr lang="en-US" smtClean="0"/>
+              <a:t>Khi 1 bytes dữ liệu được ghi vào</a:t>
+            </a:r>
+            <a:endParaRPr lang="en-US"/>
+          </a:p>
+        </p:txBody>
+      </p:sp>
+      <p:sp>
+        <p:nvSpPr>
+          <p:cNvPr id="39" name="TextBox 38"/>
+          <p:cNvSpPr txBox="1"/>
+          <p:nvPr/>
+        </p:nvSpPr>
+        <p:spPr>
+          <a:xfrm>
+            <a:off x="5514184" y="1509571"/>
+            <a:ext cx="6561275" cy="2031325"/>
+          </a:xfrm>
+          <a:prstGeom prst="rect">
+            <a:avLst/>
+          </a:prstGeom>
+          <a:noFill/>
+        </p:spPr>
+        <p:txBody>
+          <a:bodyPr wrap="square" rtlCol="0">
+            <a:spAutoFit/>
+          </a:bodyPr>
+          <a:lstStyle/>
+          <a:p>
+            <a:pPr marL="285750" indent="-285750">
+              <a:buFont typeface="Wingdings" panose="05000000000000000000" pitchFamily="2" charset="2"/>
+              <a:buChar char="§"/>
+            </a:pPr>
+            <a:r>
+              <a:rPr lang="en-US" smtClean="0"/>
+              <a:t>Với cách trên có cách tính số unit trống như sau:</a:t>
+            </a:r>
+          </a:p>
+          <a:p>
+            <a:pPr marL="285750" indent="-285750">
+              <a:buFont typeface="Wingdings" panose="05000000000000000000" pitchFamily="2" charset="2"/>
+              <a:buChar char="§"/>
+            </a:pPr>
+            <a:r>
+              <a:rPr lang="en-US" smtClean="0"/>
+              <a:t>Số byte còn trống có thể ghi được:</a:t>
+            </a:r>
+          </a:p>
+          <a:p>
+            <a:r>
+              <a:rPr lang="en-US" smtClean="0"/>
+              <a:t>size – (write index – read index) -1 </a:t>
+            </a:r>
+            <a:endParaRPr lang="en-US" smtClean="0"/>
+          </a:p>
+          <a:p>
+            <a:r>
+              <a:rPr lang="en-US" smtClean="0"/>
+              <a:t>Còn giữ lại 1 vị trí cuối để phân biệt khi nào buffer đã được đọc hết, hoặc khi nào buffer không còn byte trống để ghi..</a:t>
+            </a:r>
+          </a:p>
+          <a:p>
+            <a:endParaRPr lang="en-US"/>
+          </a:p>
+          <a:p>
+            <a:r>
+              <a:rPr lang="en-US" smtClean="0"/>
+              <a:t>Số byte còn trống có thể đọc được = 1 = write index – read  </a:t>
+            </a:r>
+            <a:r>
+              <a:rPr lang="en-US" smtClean="0"/>
+              <a:t>index</a:t>
+            </a:r>
+            <a:endParaRPr lang="en-US" smtClean="0"/>
+          </a:p>
+        </p:txBody>
+      </p:sp>
+      <p:cxnSp>
+        <p:nvCxnSpPr>
+          <p:cNvPr id="6" name="Straight Connector 5"/>
+          <p:cNvCxnSpPr/>
+          <p:nvPr/>
+        </p:nvCxnSpPr>
+        <p:spPr>
+          <a:xfrm>
+            <a:off x="2232213" y="2082151"/>
+            <a:ext cx="0" cy="3832412"/>
+          </a:xfrm>
+          <a:prstGeom prst="line">
+            <a:avLst/>
+          </a:prstGeom>
+          <a:ln>
+            <a:prstDash val="dash"/>
+          </a:ln>
+        </p:spPr>
+        <p:style>
+          <a:lnRef idx="1">
+            <a:schemeClr val="accent1"/>
+          </a:lnRef>
+          <a:fillRef idx="0">
+            <a:schemeClr val="accent1"/>
+          </a:fillRef>
+          <a:effectRef idx="0">
+            <a:schemeClr val="accent1"/>
+          </a:effectRef>
+          <a:fontRef idx="minor">
+            <a:schemeClr val="tx1"/>
+          </a:fontRef>
+        </p:style>
+      </p:cxnSp>
+      <p:sp>
+        <p:nvSpPr>
+          <p:cNvPr id="23" name="TextBox 22"/>
+          <p:cNvSpPr txBox="1"/>
+          <p:nvPr/>
+        </p:nvSpPr>
+        <p:spPr>
+          <a:xfrm rot="19589686">
+            <a:off x="951051" y="1554806"/>
+            <a:ext cx="1178400" cy="369332"/>
+          </a:xfrm>
+          <a:prstGeom prst="rect">
+            <a:avLst/>
+          </a:prstGeom>
+          <a:noFill/>
+        </p:spPr>
+        <p:txBody>
+          <a:bodyPr wrap="none" rtlCol="0">
+            <a:spAutoFit/>
+          </a:bodyPr>
+          <a:lstStyle/>
+          <a:p>
+            <a:r>
+              <a:rPr lang="en-US" smtClean="0"/>
+              <a:t>Start point</a:t>
+            </a:r>
+            <a:endParaRPr lang="en-US"/>
+          </a:p>
+        </p:txBody>
+      </p:sp>
+      <p:cxnSp>
+        <p:nvCxnSpPr>
+          <p:cNvPr id="24" name="Straight Arrow Connector 23"/>
+          <p:cNvCxnSpPr/>
+          <p:nvPr/>
+        </p:nvCxnSpPr>
+        <p:spPr>
+          <a:xfrm>
+            <a:off x="1712654" y="1950812"/>
+            <a:ext cx="411982" cy="587725"/>
+          </a:xfrm>
+          <a:prstGeom prst="straightConnector1">
+            <a:avLst/>
+          </a:prstGeom>
+          <a:ln>
+            <a:tailEnd type="triangle"/>
+          </a:ln>
+        </p:spPr>
+        <p:style>
+          <a:lnRef idx="1">
+            <a:schemeClr val="accent1"/>
+          </a:lnRef>
+          <a:fillRef idx="0">
+            <a:schemeClr val="accent1"/>
+          </a:fillRef>
+          <a:effectRef idx="0">
+            <a:schemeClr val="accent1"/>
+          </a:effectRef>
+          <a:fontRef idx="minor">
+            <a:schemeClr val="tx1"/>
+          </a:fontRef>
+        </p:style>
+      </p:cxnSp>
+      <p:sp>
+        <p:nvSpPr>
+          <p:cNvPr id="8" name="TextBox 7"/>
+          <p:cNvSpPr txBox="1"/>
+          <p:nvPr/>
+        </p:nvSpPr>
+        <p:spPr>
+          <a:xfrm>
+            <a:off x="2614019" y="2718371"/>
+            <a:ext cx="325587" cy="369332"/>
+          </a:xfrm>
+          <a:prstGeom prst="rect">
+            <a:avLst/>
+          </a:prstGeom>
+          <a:noFill/>
+          <a:ln>
+            <a:solidFill>
+              <a:srgbClr val="FFFFFF"/>
+            </a:solidFill>
+          </a:ln>
+        </p:spPr>
+        <p:txBody>
+          <a:bodyPr wrap="square" rtlCol="0">
+            <a:spAutoFit/>
+          </a:bodyPr>
+          <a:lstStyle/>
+          <a:p>
+            <a:r>
+              <a:rPr lang="en-US" smtClean="0"/>
+              <a:t>A</a:t>
+            </a:r>
+            <a:endParaRPr lang="en-US"/>
+          </a:p>
+        </p:txBody>
+      </p:sp>
+    </p:spTree>
+    <p:extLst>
+      <p:ext uri="{BB962C8B-B14F-4D97-AF65-F5344CB8AC3E}">
+        <p14:creationId xmlns:p14="http://schemas.microsoft.com/office/powerpoint/2010/main" val="1257769013"/>
+      </p:ext>
+    </p:extLst>
+  </p:cSld>
+  <p:clrMapOvr>
+    <a:masterClrMapping/>
+  </p:clrMapOvr>
+</p:sld>
+</file>
+
 <file path=ppt/slides/slide2.xml><?xml version="1.0" encoding="utf-8"?>
 <p:sld xmlns:a="http://schemas.openxmlformats.org/drawingml/2006/main" xmlns:r="http://schemas.openxmlformats.org/officeDocument/2006/relationships" xmlns:p="http://schemas.openxmlformats.org/presentationml/2006/main">
   <p:cSld>
@@ -4546,6 +7732,913 @@
       </p:par>
     </p:tnLst>
   </p:timing>
+</p:sld>
+</file>
+
+<file path=ppt/slides/slide20.xml><?xml version="1.0" encoding="utf-8"?>
+<p:sld xmlns:a="http://schemas.openxmlformats.org/drawingml/2006/main" xmlns:r="http://schemas.openxmlformats.org/officeDocument/2006/relationships" xmlns:p="http://schemas.openxmlformats.org/presentationml/2006/main">
+  <p:cSld>
+    <p:spTree>
+      <p:nvGrpSpPr>
+        <p:cNvPr id="1" name=""/>
+        <p:cNvGrpSpPr/>
+        <p:nvPr/>
+      </p:nvGrpSpPr>
+      <p:grpSpPr>
+        <a:xfrm>
+          <a:off x="0" y="0"/>
+          <a:ext cx="0" cy="0"/>
+          <a:chOff x="0" y="0"/>
+          <a:chExt cx="0" cy="0"/>
+        </a:xfrm>
+      </p:grpSpPr>
+      <p:sp>
+        <p:nvSpPr>
+          <p:cNvPr id="2" name="Title 1"/>
+          <p:cNvSpPr>
+            <a:spLocks noGrp="1"/>
+          </p:cNvSpPr>
+          <p:nvPr>
+            <p:ph type="title"/>
+          </p:nvPr>
+        </p:nvSpPr>
+        <p:spPr>
+          <a:xfrm>
+            <a:off x="838200" y="365125"/>
+            <a:ext cx="10515600" cy="895031"/>
+          </a:xfrm>
+        </p:spPr>
+        <p:txBody>
+          <a:bodyPr/>
+          <a:lstStyle/>
+          <a:p>
+            <a:r>
+              <a:rPr lang="en-US" smtClean="0"/>
+              <a:t>RING BUFFER ( SIZE = 8)</a:t>
+            </a:r>
+            <a:endParaRPr lang="en-US"/>
+          </a:p>
+        </p:txBody>
+      </p:sp>
+      <p:sp>
+        <p:nvSpPr>
+          <p:cNvPr id="4" name="Oval 3"/>
+          <p:cNvSpPr/>
+          <p:nvPr/>
+        </p:nvSpPr>
+        <p:spPr>
+          <a:xfrm>
+            <a:off x="1734671" y="2501153"/>
+            <a:ext cx="2823882" cy="2823882"/>
+          </a:xfrm>
+          <a:prstGeom prst="ellipse">
+            <a:avLst/>
+          </a:prstGeom>
+          <a:noFill/>
+          <a:ln>
+            <a:solidFill>
+              <a:schemeClr val="tx1"/>
+            </a:solidFill>
+          </a:ln>
+        </p:spPr>
+        <p:style>
+          <a:lnRef idx="2">
+            <a:schemeClr val="accent1">
+              <a:shade val="50000"/>
+            </a:schemeClr>
+          </a:lnRef>
+          <a:fillRef idx="1">
+            <a:schemeClr val="accent1"/>
+          </a:fillRef>
+          <a:effectRef idx="0">
+            <a:schemeClr val="accent1"/>
+          </a:effectRef>
+          <a:fontRef idx="minor">
+            <a:schemeClr val="lt1"/>
+          </a:fontRef>
+        </p:style>
+        <p:txBody>
+          <a:bodyPr rtlCol="0" anchor="ctr"/>
+          <a:lstStyle/>
+          <a:p>
+            <a:pPr algn="ctr"/>
+            <a:endParaRPr lang="en-US"/>
+          </a:p>
+        </p:txBody>
+      </p:sp>
+      <p:sp>
+        <p:nvSpPr>
+          <p:cNvPr id="5" name="Oval 4"/>
+          <p:cNvSpPr/>
+          <p:nvPr/>
+        </p:nvSpPr>
+        <p:spPr>
+          <a:xfrm>
+            <a:off x="2070848" y="2833173"/>
+            <a:ext cx="2151530" cy="2151530"/>
+          </a:xfrm>
+          <a:prstGeom prst="ellipse">
+            <a:avLst/>
+          </a:prstGeom>
+          <a:solidFill>
+            <a:schemeClr val="bg1"/>
+          </a:solidFill>
+          <a:ln>
+            <a:solidFill>
+              <a:schemeClr val="tx1"/>
+            </a:solidFill>
+          </a:ln>
+        </p:spPr>
+        <p:style>
+          <a:lnRef idx="2">
+            <a:schemeClr val="accent1">
+              <a:shade val="50000"/>
+            </a:schemeClr>
+          </a:lnRef>
+          <a:fillRef idx="1">
+            <a:schemeClr val="accent1"/>
+          </a:fillRef>
+          <a:effectRef idx="0">
+            <a:schemeClr val="accent1"/>
+          </a:effectRef>
+          <a:fontRef idx="minor">
+            <a:schemeClr val="lt1"/>
+          </a:fontRef>
+        </p:style>
+        <p:txBody>
+          <a:bodyPr rtlCol="0" anchor="ctr"/>
+          <a:lstStyle/>
+          <a:p>
+            <a:pPr algn="ctr"/>
+            <a:endParaRPr lang="en-US"/>
+          </a:p>
+        </p:txBody>
+      </p:sp>
+      <p:cxnSp>
+        <p:nvCxnSpPr>
+          <p:cNvPr id="7" name="Straight Connector 6"/>
+          <p:cNvCxnSpPr>
+            <a:stCxn id="4" idx="1"/>
+            <a:endCxn id="5" idx="1"/>
+          </p:cNvCxnSpPr>
+          <p:nvPr/>
+        </p:nvCxnSpPr>
+        <p:spPr>
+          <a:xfrm>
+            <a:off x="2148219" y="2914701"/>
+            <a:ext cx="237713" cy="233556"/>
+          </a:xfrm>
+          <a:prstGeom prst="line">
+            <a:avLst/>
+          </a:prstGeom>
+        </p:spPr>
+        <p:style>
+          <a:lnRef idx="1">
+            <a:schemeClr val="accent1"/>
+          </a:lnRef>
+          <a:fillRef idx="0">
+            <a:schemeClr val="accent1"/>
+          </a:fillRef>
+          <a:effectRef idx="0">
+            <a:schemeClr val="accent1"/>
+          </a:effectRef>
+          <a:fontRef idx="minor">
+            <a:schemeClr val="tx1"/>
+          </a:fontRef>
+        </p:style>
+      </p:cxnSp>
+      <p:cxnSp>
+        <p:nvCxnSpPr>
+          <p:cNvPr id="9" name="Straight Connector 8"/>
+          <p:cNvCxnSpPr>
+            <a:stCxn id="4" idx="0"/>
+            <a:endCxn id="5" idx="0"/>
+          </p:cNvCxnSpPr>
+          <p:nvPr/>
+        </p:nvCxnSpPr>
+        <p:spPr>
+          <a:xfrm>
+            <a:off x="3146612" y="2501153"/>
+            <a:ext cx="1" cy="332020"/>
+          </a:xfrm>
+          <a:prstGeom prst="line">
+            <a:avLst/>
+          </a:prstGeom>
+        </p:spPr>
+        <p:style>
+          <a:lnRef idx="1">
+            <a:schemeClr val="accent1"/>
+          </a:lnRef>
+          <a:fillRef idx="0">
+            <a:schemeClr val="accent1"/>
+          </a:fillRef>
+          <a:effectRef idx="0">
+            <a:schemeClr val="accent1"/>
+          </a:effectRef>
+          <a:fontRef idx="minor">
+            <a:schemeClr val="tx1"/>
+          </a:fontRef>
+        </p:style>
+      </p:cxnSp>
+      <p:cxnSp>
+        <p:nvCxnSpPr>
+          <p:cNvPr id="12" name="Straight Connector 11"/>
+          <p:cNvCxnSpPr>
+            <a:stCxn id="4" idx="7"/>
+            <a:endCxn id="5" idx="7"/>
+          </p:cNvCxnSpPr>
+          <p:nvPr/>
+        </p:nvCxnSpPr>
+        <p:spPr>
+          <a:xfrm flipH="1">
+            <a:off x="3907294" y="2914701"/>
+            <a:ext cx="237711" cy="233556"/>
+          </a:xfrm>
+          <a:prstGeom prst="line">
+            <a:avLst/>
+          </a:prstGeom>
+        </p:spPr>
+        <p:style>
+          <a:lnRef idx="1">
+            <a:schemeClr val="accent1"/>
+          </a:lnRef>
+          <a:fillRef idx="0">
+            <a:schemeClr val="accent1"/>
+          </a:fillRef>
+          <a:effectRef idx="0">
+            <a:schemeClr val="accent1"/>
+          </a:effectRef>
+          <a:fontRef idx="minor">
+            <a:schemeClr val="tx1"/>
+          </a:fontRef>
+        </p:style>
+      </p:cxnSp>
+      <p:cxnSp>
+        <p:nvCxnSpPr>
+          <p:cNvPr id="14" name="Straight Connector 13"/>
+          <p:cNvCxnSpPr>
+            <a:stCxn id="5" idx="6"/>
+            <a:endCxn id="4" idx="6"/>
+          </p:cNvCxnSpPr>
+          <p:nvPr/>
+        </p:nvCxnSpPr>
+        <p:spPr>
+          <a:xfrm>
+            <a:off x="4222378" y="3908938"/>
+            <a:ext cx="336175" cy="4156"/>
+          </a:xfrm>
+          <a:prstGeom prst="line">
+            <a:avLst/>
+          </a:prstGeom>
+        </p:spPr>
+        <p:style>
+          <a:lnRef idx="1">
+            <a:schemeClr val="accent1"/>
+          </a:lnRef>
+          <a:fillRef idx="0">
+            <a:schemeClr val="accent1"/>
+          </a:fillRef>
+          <a:effectRef idx="0">
+            <a:schemeClr val="accent1"/>
+          </a:effectRef>
+          <a:fontRef idx="minor">
+            <a:schemeClr val="tx1"/>
+          </a:fontRef>
+        </p:style>
+      </p:cxnSp>
+      <p:cxnSp>
+        <p:nvCxnSpPr>
+          <p:cNvPr id="16" name="Straight Connector 15"/>
+          <p:cNvCxnSpPr>
+            <a:stCxn id="5" idx="5"/>
+            <a:endCxn id="4" idx="5"/>
+          </p:cNvCxnSpPr>
+          <p:nvPr/>
+        </p:nvCxnSpPr>
+        <p:spPr>
+          <a:xfrm>
+            <a:off x="3907294" y="4669619"/>
+            <a:ext cx="237711" cy="241868"/>
+          </a:xfrm>
+          <a:prstGeom prst="line">
+            <a:avLst/>
+          </a:prstGeom>
+        </p:spPr>
+        <p:style>
+          <a:lnRef idx="1">
+            <a:schemeClr val="accent1"/>
+          </a:lnRef>
+          <a:fillRef idx="0">
+            <a:schemeClr val="accent1"/>
+          </a:fillRef>
+          <a:effectRef idx="0">
+            <a:schemeClr val="accent1"/>
+          </a:effectRef>
+          <a:fontRef idx="minor">
+            <a:schemeClr val="tx1"/>
+          </a:fontRef>
+        </p:style>
+      </p:cxnSp>
+      <p:cxnSp>
+        <p:nvCxnSpPr>
+          <p:cNvPr id="18" name="Straight Connector 17"/>
+          <p:cNvCxnSpPr>
+            <a:stCxn id="5" idx="4"/>
+            <a:endCxn id="4" idx="4"/>
+          </p:cNvCxnSpPr>
+          <p:nvPr/>
+        </p:nvCxnSpPr>
+        <p:spPr>
+          <a:xfrm flipH="1">
+            <a:off x="3146612" y="4984703"/>
+            <a:ext cx="1" cy="340332"/>
+          </a:xfrm>
+          <a:prstGeom prst="line">
+            <a:avLst/>
+          </a:prstGeom>
+        </p:spPr>
+        <p:style>
+          <a:lnRef idx="1">
+            <a:schemeClr val="accent1"/>
+          </a:lnRef>
+          <a:fillRef idx="0">
+            <a:schemeClr val="accent1"/>
+          </a:fillRef>
+          <a:effectRef idx="0">
+            <a:schemeClr val="accent1"/>
+          </a:effectRef>
+          <a:fontRef idx="minor">
+            <a:schemeClr val="tx1"/>
+          </a:fontRef>
+        </p:style>
+      </p:cxnSp>
+      <p:cxnSp>
+        <p:nvCxnSpPr>
+          <p:cNvPr id="20" name="Straight Connector 19"/>
+          <p:cNvCxnSpPr>
+            <a:stCxn id="5" idx="3"/>
+            <a:endCxn id="4" idx="3"/>
+          </p:cNvCxnSpPr>
+          <p:nvPr/>
+        </p:nvCxnSpPr>
+        <p:spPr>
+          <a:xfrm flipH="1">
+            <a:off x="2148219" y="4669619"/>
+            <a:ext cx="237713" cy="241868"/>
+          </a:xfrm>
+          <a:prstGeom prst="line">
+            <a:avLst/>
+          </a:prstGeom>
+        </p:spPr>
+        <p:style>
+          <a:lnRef idx="1">
+            <a:schemeClr val="accent1"/>
+          </a:lnRef>
+          <a:fillRef idx="0">
+            <a:schemeClr val="accent1"/>
+          </a:fillRef>
+          <a:effectRef idx="0">
+            <a:schemeClr val="accent1"/>
+          </a:effectRef>
+          <a:fontRef idx="minor">
+            <a:schemeClr val="tx1"/>
+          </a:fontRef>
+        </p:style>
+      </p:cxnSp>
+      <p:cxnSp>
+        <p:nvCxnSpPr>
+          <p:cNvPr id="22" name="Straight Connector 21"/>
+          <p:cNvCxnSpPr>
+            <a:stCxn id="4" idx="2"/>
+            <a:endCxn id="5" idx="2"/>
+          </p:cNvCxnSpPr>
+          <p:nvPr/>
+        </p:nvCxnSpPr>
+        <p:spPr>
+          <a:xfrm flipV="1">
+            <a:off x="1734671" y="3908938"/>
+            <a:ext cx="336177" cy="4156"/>
+          </a:xfrm>
+          <a:prstGeom prst="line">
+            <a:avLst/>
+          </a:prstGeom>
+        </p:spPr>
+        <p:style>
+          <a:lnRef idx="1">
+            <a:schemeClr val="accent1"/>
+          </a:lnRef>
+          <a:fillRef idx="0">
+            <a:schemeClr val="accent1"/>
+          </a:fillRef>
+          <a:effectRef idx="0">
+            <a:schemeClr val="accent1"/>
+          </a:effectRef>
+          <a:fontRef idx="minor">
+            <a:schemeClr val="tx1"/>
+          </a:fontRef>
+        </p:style>
+      </p:cxnSp>
+      <p:sp>
+        <p:nvSpPr>
+          <p:cNvPr id="25" name="TextBox 24"/>
+          <p:cNvSpPr txBox="1"/>
+          <p:nvPr/>
+        </p:nvSpPr>
+        <p:spPr>
+          <a:xfrm rot="3504052">
+            <a:off x="4468225" y="2234215"/>
+            <a:ext cx="1605055" cy="369332"/>
+          </a:xfrm>
+          <a:prstGeom prst="rect">
+            <a:avLst/>
+          </a:prstGeom>
+          <a:noFill/>
+        </p:spPr>
+        <p:txBody>
+          <a:bodyPr wrap="none" rtlCol="0">
+            <a:spAutoFit/>
+          </a:bodyPr>
+          <a:lstStyle/>
+          <a:p>
+            <a:r>
+              <a:rPr lang="en-US" smtClean="0"/>
+              <a:t>Write </a:t>
+            </a:r>
+            <a:r>
+              <a:rPr lang="en-US" smtClean="0"/>
+              <a:t>index = 0</a:t>
+            </a:r>
+            <a:endParaRPr lang="en-US"/>
+          </a:p>
+        </p:txBody>
+      </p:sp>
+      <p:cxnSp>
+        <p:nvCxnSpPr>
+          <p:cNvPr id="27" name="Straight Arrow Connector 26"/>
+          <p:cNvCxnSpPr/>
+          <p:nvPr/>
+        </p:nvCxnSpPr>
+        <p:spPr>
+          <a:xfrm flipH="1" flipV="1">
+            <a:off x="3448991" y="2452706"/>
+            <a:ext cx="1109562" cy="2729"/>
+          </a:xfrm>
+          <a:prstGeom prst="straightConnector1">
+            <a:avLst/>
+          </a:prstGeom>
+          <a:ln>
+            <a:tailEnd type="triangle"/>
+          </a:ln>
+        </p:spPr>
+        <p:style>
+          <a:lnRef idx="1">
+            <a:schemeClr val="accent1"/>
+          </a:lnRef>
+          <a:fillRef idx="0">
+            <a:schemeClr val="accent1"/>
+          </a:fillRef>
+          <a:effectRef idx="0">
+            <a:schemeClr val="accent1"/>
+          </a:effectRef>
+          <a:fontRef idx="minor">
+            <a:schemeClr val="tx1"/>
+          </a:fontRef>
+        </p:style>
+      </p:cxnSp>
+      <p:sp>
+        <p:nvSpPr>
+          <p:cNvPr id="29" name="TextBox 28"/>
+          <p:cNvSpPr txBox="1"/>
+          <p:nvPr/>
+        </p:nvSpPr>
+        <p:spPr>
+          <a:xfrm rot="1562124">
+            <a:off x="3156002" y="1408274"/>
+            <a:ext cx="1586847" cy="369332"/>
+          </a:xfrm>
+          <a:prstGeom prst="rect">
+            <a:avLst/>
+          </a:prstGeom>
+          <a:noFill/>
+        </p:spPr>
+        <p:txBody>
+          <a:bodyPr wrap="square" rtlCol="0">
+            <a:spAutoFit/>
+          </a:bodyPr>
+          <a:lstStyle/>
+          <a:p>
+            <a:r>
+              <a:rPr lang="en-US" smtClean="0"/>
+              <a:t>Read </a:t>
+            </a:r>
+            <a:r>
+              <a:rPr lang="en-US" smtClean="0"/>
+              <a:t>index = 0</a:t>
+            </a:r>
+            <a:endParaRPr lang="en-US"/>
+          </a:p>
+        </p:txBody>
+      </p:sp>
+      <p:cxnSp>
+        <p:nvCxnSpPr>
+          <p:cNvPr id="30" name="Straight Arrow Connector 29"/>
+          <p:cNvCxnSpPr/>
+          <p:nvPr/>
+        </p:nvCxnSpPr>
+        <p:spPr>
+          <a:xfrm flipH="1">
+            <a:off x="3296016" y="1765126"/>
+            <a:ext cx="557989" cy="683992"/>
+          </a:xfrm>
+          <a:prstGeom prst="straightConnector1">
+            <a:avLst/>
+          </a:prstGeom>
+          <a:ln>
+            <a:tailEnd type="triangle"/>
+          </a:ln>
+        </p:spPr>
+        <p:style>
+          <a:lnRef idx="1">
+            <a:schemeClr val="accent1"/>
+          </a:lnRef>
+          <a:fillRef idx="0">
+            <a:schemeClr val="accent1"/>
+          </a:fillRef>
+          <a:effectRef idx="0">
+            <a:schemeClr val="accent1"/>
+          </a:effectRef>
+          <a:fontRef idx="minor">
+            <a:schemeClr val="tx1"/>
+          </a:fontRef>
+        </p:style>
+      </p:cxnSp>
+      <p:sp>
+        <p:nvSpPr>
+          <p:cNvPr id="37" name="Arc 36"/>
+          <p:cNvSpPr/>
+          <p:nvPr/>
+        </p:nvSpPr>
+        <p:spPr>
+          <a:xfrm rot="3361383">
+            <a:off x="2363862" y="3124845"/>
+            <a:ext cx="2299269" cy="2534984"/>
+          </a:xfrm>
+          <a:prstGeom prst="arc">
+            <a:avLst>
+              <a:gd name="adj1" fmla="val 17435477"/>
+              <a:gd name="adj2" fmla="val 2814004"/>
+            </a:avLst>
+          </a:prstGeom>
+          <a:ln>
+            <a:headEnd type="stealth"/>
+            <a:tailEnd type="stealth"/>
+          </a:ln>
+        </p:spPr>
+        <p:style>
+          <a:lnRef idx="1">
+            <a:schemeClr val="accent1"/>
+          </a:lnRef>
+          <a:fillRef idx="0">
+            <a:schemeClr val="accent1"/>
+          </a:fillRef>
+          <a:effectRef idx="0">
+            <a:schemeClr val="accent1"/>
+          </a:effectRef>
+          <a:fontRef idx="minor">
+            <a:schemeClr val="tx1"/>
+          </a:fontRef>
+        </p:style>
+        <p:txBody>
+          <a:bodyPr rtlCol="0" anchor="ctr"/>
+          <a:lstStyle/>
+          <a:p>
+            <a:pPr algn="ctr"/>
+            <a:endParaRPr lang="en-US"/>
+          </a:p>
+        </p:txBody>
+      </p:sp>
+      <p:sp>
+        <p:nvSpPr>
+          <p:cNvPr id="38" name="TextBox 37"/>
+          <p:cNvSpPr txBox="1"/>
+          <p:nvPr/>
+        </p:nvSpPr>
+        <p:spPr>
+          <a:xfrm>
+            <a:off x="1752693" y="5927023"/>
+            <a:ext cx="3190810" cy="369332"/>
+          </a:xfrm>
+          <a:prstGeom prst="rect">
+            <a:avLst/>
+          </a:prstGeom>
+          <a:noFill/>
+        </p:spPr>
+        <p:txBody>
+          <a:bodyPr wrap="none" rtlCol="0">
+            <a:spAutoFit/>
+          </a:bodyPr>
+          <a:lstStyle/>
+          <a:p>
+            <a:r>
+              <a:rPr lang="en-US" smtClean="0"/>
+              <a:t>Khi 2 bytes dữ liệu được ghi vào</a:t>
+            </a:r>
+            <a:endParaRPr lang="en-US"/>
+          </a:p>
+        </p:txBody>
+      </p:sp>
+      <p:sp>
+        <p:nvSpPr>
+          <p:cNvPr id="39" name="TextBox 38"/>
+          <p:cNvSpPr txBox="1"/>
+          <p:nvPr/>
+        </p:nvSpPr>
+        <p:spPr>
+          <a:xfrm>
+            <a:off x="6583776" y="1509571"/>
+            <a:ext cx="4770024" cy="646331"/>
+          </a:xfrm>
+          <a:prstGeom prst="rect">
+            <a:avLst/>
+          </a:prstGeom>
+          <a:noFill/>
+        </p:spPr>
+        <p:txBody>
+          <a:bodyPr wrap="none" rtlCol="0">
+            <a:spAutoFit/>
+          </a:bodyPr>
+          <a:lstStyle/>
+          <a:p>
+            <a:pPr marL="285750" indent="-285750">
+              <a:buFont typeface="Wingdings" panose="05000000000000000000" pitchFamily="2" charset="2"/>
+              <a:buChar char="§"/>
+            </a:pPr>
+            <a:r>
+              <a:rPr lang="en-US" smtClean="0"/>
+              <a:t>Số </a:t>
+            </a:r>
+            <a:r>
+              <a:rPr lang="en-US" smtClean="0"/>
+              <a:t>byte còn trống có thể ghi được = 6 = size – </a:t>
+            </a:r>
+          </a:p>
+          <a:p>
+            <a:r>
+              <a:rPr lang="en-US" smtClean="0"/>
+              <a:t>(write index – read index) - 1 </a:t>
+            </a:r>
+            <a:endParaRPr lang="en-US"/>
+          </a:p>
+        </p:txBody>
+      </p:sp>
+      <p:cxnSp>
+        <p:nvCxnSpPr>
+          <p:cNvPr id="6" name="Straight Connector 5"/>
+          <p:cNvCxnSpPr/>
+          <p:nvPr/>
+        </p:nvCxnSpPr>
+        <p:spPr>
+          <a:xfrm>
+            <a:off x="3146612" y="2017059"/>
+            <a:ext cx="0" cy="3832412"/>
+          </a:xfrm>
+          <a:prstGeom prst="line">
+            <a:avLst/>
+          </a:prstGeom>
+          <a:ln>
+            <a:prstDash val="dash"/>
+          </a:ln>
+        </p:spPr>
+        <p:style>
+          <a:lnRef idx="1">
+            <a:schemeClr val="accent1"/>
+          </a:lnRef>
+          <a:fillRef idx="0">
+            <a:schemeClr val="accent1"/>
+          </a:fillRef>
+          <a:effectRef idx="0">
+            <a:schemeClr val="accent1"/>
+          </a:effectRef>
+          <a:fontRef idx="minor">
+            <a:schemeClr val="tx1"/>
+          </a:fontRef>
+        </p:style>
+      </p:cxnSp>
+      <p:sp>
+        <p:nvSpPr>
+          <p:cNvPr id="23" name="TextBox 22"/>
+          <p:cNvSpPr txBox="1"/>
+          <p:nvPr/>
+        </p:nvSpPr>
+        <p:spPr>
+          <a:xfrm rot="19589686">
+            <a:off x="1865450" y="1465387"/>
+            <a:ext cx="1178400" cy="369332"/>
+          </a:xfrm>
+          <a:prstGeom prst="rect">
+            <a:avLst/>
+          </a:prstGeom>
+          <a:noFill/>
+        </p:spPr>
+        <p:txBody>
+          <a:bodyPr wrap="none" rtlCol="0">
+            <a:spAutoFit/>
+          </a:bodyPr>
+          <a:lstStyle/>
+          <a:p>
+            <a:r>
+              <a:rPr lang="en-US" smtClean="0"/>
+              <a:t>Start point</a:t>
+            </a:r>
+            <a:endParaRPr lang="en-US"/>
+          </a:p>
+        </p:txBody>
+      </p:sp>
+      <p:cxnSp>
+        <p:nvCxnSpPr>
+          <p:cNvPr id="24" name="Straight Arrow Connector 23"/>
+          <p:cNvCxnSpPr/>
+          <p:nvPr/>
+        </p:nvCxnSpPr>
+        <p:spPr>
+          <a:xfrm>
+            <a:off x="2627053" y="1861393"/>
+            <a:ext cx="411982" cy="587725"/>
+          </a:xfrm>
+          <a:prstGeom prst="straightConnector1">
+            <a:avLst/>
+          </a:prstGeom>
+          <a:ln>
+            <a:tailEnd type="triangle"/>
+          </a:ln>
+        </p:spPr>
+        <p:style>
+          <a:lnRef idx="1">
+            <a:schemeClr val="accent1"/>
+          </a:lnRef>
+          <a:fillRef idx="0">
+            <a:schemeClr val="accent1"/>
+          </a:fillRef>
+          <a:effectRef idx="0">
+            <a:schemeClr val="accent1"/>
+          </a:effectRef>
+          <a:fontRef idx="minor">
+            <a:schemeClr val="tx1"/>
+          </a:fontRef>
+        </p:style>
+      </p:cxnSp>
+      <p:sp>
+        <p:nvSpPr>
+          <p:cNvPr id="8" name="TextBox 7"/>
+          <p:cNvSpPr txBox="1"/>
+          <p:nvPr/>
+        </p:nvSpPr>
+        <p:spPr>
+          <a:xfrm>
+            <a:off x="3528418" y="2628952"/>
+            <a:ext cx="325587" cy="369332"/>
+          </a:xfrm>
+          <a:prstGeom prst="rect">
+            <a:avLst/>
+          </a:prstGeom>
+          <a:noFill/>
+          <a:ln>
+            <a:solidFill>
+              <a:srgbClr val="FFFFFF"/>
+            </a:solidFill>
+          </a:ln>
+        </p:spPr>
+        <p:txBody>
+          <a:bodyPr wrap="square" rtlCol="0">
+            <a:spAutoFit/>
+          </a:bodyPr>
+          <a:lstStyle/>
+          <a:p>
+            <a:r>
+              <a:rPr lang="en-US" smtClean="0"/>
+              <a:t>A</a:t>
+            </a:r>
+            <a:endParaRPr lang="en-US"/>
+          </a:p>
+        </p:txBody>
+      </p:sp>
+      <p:sp>
+        <p:nvSpPr>
+          <p:cNvPr id="26" name="TextBox 25"/>
+          <p:cNvSpPr txBox="1"/>
+          <p:nvPr/>
+        </p:nvSpPr>
+        <p:spPr>
+          <a:xfrm>
+            <a:off x="4194193" y="3267480"/>
+            <a:ext cx="212764" cy="369332"/>
+          </a:xfrm>
+          <a:prstGeom prst="rect">
+            <a:avLst/>
+          </a:prstGeom>
+          <a:noFill/>
+        </p:spPr>
+        <p:txBody>
+          <a:bodyPr wrap="square" rtlCol="0">
+            <a:spAutoFit/>
+          </a:bodyPr>
+          <a:lstStyle/>
+          <a:p>
+            <a:r>
+              <a:rPr lang="en-US"/>
+              <a:t>B</a:t>
+            </a:r>
+          </a:p>
+        </p:txBody>
+      </p:sp>
+    </p:spTree>
+    <p:extLst>
+      <p:ext uri="{BB962C8B-B14F-4D97-AF65-F5344CB8AC3E}">
+        <p14:creationId xmlns:p14="http://schemas.microsoft.com/office/powerpoint/2010/main" val="1176980043"/>
+      </p:ext>
+    </p:extLst>
+  </p:cSld>
+  <p:clrMapOvr>
+    <a:masterClrMapping/>
+  </p:clrMapOvr>
+</p:sld>
+</file>
+
+<file path=ppt/slides/slide21.xml><?xml version="1.0" encoding="utf-8"?>
+<p:sld xmlns:a="http://schemas.openxmlformats.org/drawingml/2006/main" xmlns:r="http://schemas.openxmlformats.org/officeDocument/2006/relationships" xmlns:p="http://schemas.openxmlformats.org/presentationml/2006/main">
+  <p:cSld>
+    <p:spTree>
+      <p:nvGrpSpPr>
+        <p:cNvPr id="1" name=""/>
+        <p:cNvGrpSpPr/>
+        <p:nvPr/>
+      </p:nvGrpSpPr>
+      <p:grpSpPr>
+        <a:xfrm>
+          <a:off x="0" y="0"/>
+          <a:ext cx="0" cy="0"/>
+          <a:chOff x="0" y="0"/>
+          <a:chExt cx="0" cy="0"/>
+        </a:xfrm>
+      </p:grpSpPr>
+      <p:sp>
+        <p:nvSpPr>
+          <p:cNvPr id="2" name="Title 1"/>
+          <p:cNvSpPr>
+            <a:spLocks noGrp="1"/>
+          </p:cNvSpPr>
+          <p:nvPr>
+            <p:ph type="title"/>
+          </p:nvPr>
+        </p:nvSpPr>
+        <p:spPr/>
+        <p:txBody>
+          <a:bodyPr/>
+          <a:lstStyle/>
+          <a:p>
+            <a:endParaRPr lang="en-US"/>
+          </a:p>
+        </p:txBody>
+      </p:sp>
+      <p:sp>
+        <p:nvSpPr>
+          <p:cNvPr id="3" name="Content Placeholder 2"/>
+          <p:cNvSpPr>
+            <a:spLocks noGrp="1"/>
+          </p:cNvSpPr>
+          <p:nvPr>
+            <p:ph idx="1"/>
+          </p:nvPr>
+        </p:nvSpPr>
+        <p:spPr/>
+        <p:txBody>
+          <a:bodyPr/>
+          <a:lstStyle/>
+          <a:p>
+            <a:r>
+              <a:rPr lang="en-US" smtClean="0"/>
+              <a:t>TIM2: DTH22</a:t>
+            </a:r>
+            <a:endParaRPr lang="en-US"/>
+          </a:p>
+          <a:p>
+            <a:r>
+              <a:rPr lang="en-US" smtClean="0"/>
+              <a:t>TIM3: ESP8266</a:t>
+            </a:r>
+          </a:p>
+        </p:txBody>
+      </p:sp>
+    </p:spTree>
+    <p:extLst>
+      <p:ext uri="{BB962C8B-B14F-4D97-AF65-F5344CB8AC3E}">
+        <p14:creationId xmlns:p14="http://schemas.microsoft.com/office/powerpoint/2010/main" val="4085357518"/>
+      </p:ext>
+    </p:extLst>
+  </p:cSld>
+  <p:clrMapOvr>
+    <a:masterClrMapping/>
+  </p:clrMapOvr>
 </p:sld>
 </file>
 

</xml_diff>